<commit_message>
Added requirement that lists must be sorted.
</commit_message>
<xml_diff>
--- a/Storyboards.pptx
+++ b/Storyboards.pptx
@@ -276,7 +276,7 @@
           <a:p>
             <a:fld id="{6BD9EFDA-B2D7-4158-9C99-97A757CEE85B}" type="datetimeFigureOut">
               <a:rPr lang="de-DE" smtClean="0"/>
-              <a:t>14.11.2017</a:t>
+              <a:t>15.11.2017</a:t>
             </a:fld>
             <a:endParaRPr lang="de-DE"/>
           </a:p>
@@ -474,7 +474,7 @@
           <a:p>
             <a:fld id="{6BD9EFDA-B2D7-4158-9C99-97A757CEE85B}" type="datetimeFigureOut">
               <a:rPr lang="de-DE" smtClean="0"/>
-              <a:t>14.11.2017</a:t>
+              <a:t>15.11.2017</a:t>
             </a:fld>
             <a:endParaRPr lang="de-DE"/>
           </a:p>
@@ -682,7 +682,7 @@
           <a:p>
             <a:fld id="{6BD9EFDA-B2D7-4158-9C99-97A757CEE85B}" type="datetimeFigureOut">
               <a:rPr lang="de-DE" smtClean="0"/>
-              <a:t>14.11.2017</a:t>
+              <a:t>15.11.2017</a:t>
             </a:fld>
             <a:endParaRPr lang="de-DE"/>
           </a:p>
@@ -880,7 +880,7 @@
           <a:p>
             <a:fld id="{6BD9EFDA-B2D7-4158-9C99-97A757CEE85B}" type="datetimeFigureOut">
               <a:rPr lang="de-DE" smtClean="0"/>
-              <a:t>14.11.2017</a:t>
+              <a:t>15.11.2017</a:t>
             </a:fld>
             <a:endParaRPr lang="de-DE"/>
           </a:p>
@@ -1155,7 +1155,7 @@
           <a:p>
             <a:fld id="{6BD9EFDA-B2D7-4158-9C99-97A757CEE85B}" type="datetimeFigureOut">
               <a:rPr lang="de-DE" smtClean="0"/>
-              <a:t>14.11.2017</a:t>
+              <a:t>15.11.2017</a:t>
             </a:fld>
             <a:endParaRPr lang="de-DE"/>
           </a:p>
@@ -1420,7 +1420,7 @@
           <a:p>
             <a:fld id="{6BD9EFDA-B2D7-4158-9C99-97A757CEE85B}" type="datetimeFigureOut">
               <a:rPr lang="de-DE" smtClean="0"/>
-              <a:t>14.11.2017</a:t>
+              <a:t>15.11.2017</a:t>
             </a:fld>
             <a:endParaRPr lang="de-DE"/>
           </a:p>
@@ -1832,7 +1832,7 @@
           <a:p>
             <a:fld id="{6BD9EFDA-B2D7-4158-9C99-97A757CEE85B}" type="datetimeFigureOut">
               <a:rPr lang="de-DE" smtClean="0"/>
-              <a:t>14.11.2017</a:t>
+              <a:t>15.11.2017</a:t>
             </a:fld>
             <a:endParaRPr lang="de-DE"/>
           </a:p>
@@ -1973,7 +1973,7 @@
           <a:p>
             <a:fld id="{6BD9EFDA-B2D7-4158-9C99-97A757CEE85B}" type="datetimeFigureOut">
               <a:rPr lang="de-DE" smtClean="0"/>
-              <a:t>14.11.2017</a:t>
+              <a:t>15.11.2017</a:t>
             </a:fld>
             <a:endParaRPr lang="de-DE"/>
           </a:p>
@@ -2086,7 +2086,7 @@
           <a:p>
             <a:fld id="{6BD9EFDA-B2D7-4158-9C99-97A757CEE85B}" type="datetimeFigureOut">
               <a:rPr lang="de-DE" smtClean="0"/>
-              <a:t>14.11.2017</a:t>
+              <a:t>15.11.2017</a:t>
             </a:fld>
             <a:endParaRPr lang="de-DE"/>
           </a:p>
@@ -2397,7 +2397,7 @@
           <a:p>
             <a:fld id="{6BD9EFDA-B2D7-4158-9C99-97A757CEE85B}" type="datetimeFigureOut">
               <a:rPr lang="de-DE" smtClean="0"/>
-              <a:t>14.11.2017</a:t>
+              <a:t>15.11.2017</a:t>
             </a:fld>
             <a:endParaRPr lang="de-DE"/>
           </a:p>
@@ -2685,7 +2685,7 @@
           <a:p>
             <a:fld id="{6BD9EFDA-B2D7-4158-9C99-97A757CEE85B}" type="datetimeFigureOut">
               <a:rPr lang="de-DE" smtClean="0"/>
-              <a:t>14.11.2017</a:t>
+              <a:t>15.11.2017</a:t>
             </a:fld>
             <a:endParaRPr lang="de-DE"/>
           </a:p>
@@ -2926,7 +2926,7 @@
           <a:p>
             <a:fld id="{6BD9EFDA-B2D7-4158-9C99-97A757CEE85B}" type="datetimeFigureOut">
               <a:rPr lang="de-DE" smtClean="0"/>
-              <a:t>14.11.2017</a:t>
+              <a:t>15.11.2017</a:t>
             </a:fld>
             <a:endParaRPr lang="de-DE"/>
           </a:p>
@@ -8923,7 +8923,7 @@
           </p:style>
           <p:txBody>
             <a:bodyPr lIns="91440" tIns="137160" rIns="91440" bIns="45720" rtlCol="0" anchor="t" anchorCtr="0">
-              <a:normAutofit/>
+              <a:normAutofit lnSpcReduction="10000"/>
             </a:bodyPr>
             <a:lstStyle/>
             <a:p>
@@ -9039,6 +9039,27 @@
                   <a:cs typeface="Segoe UI" pitchFamily="34" charset="0"/>
                 </a:rPr>
                 <a:t> selected when the view is initialized or filter was changed.</a:t>
+              </a:r>
+            </a:p>
+            <a:p>
+              <a:endParaRPr lang="en-US" sz="1200" dirty="0">
+                <a:solidFill>
+                  <a:sysClr val="windowText" lastClr="000000"/>
+                </a:solidFill>
+                <a:latin typeface="Segoe UI" pitchFamily="34" charset="0"/>
+                <a:cs typeface="Segoe UI" pitchFamily="34" charset="0"/>
+              </a:endParaRPr>
+            </a:p>
+            <a:p>
+              <a:r>
+                <a:rPr lang="en-US" sz="1200" dirty="0">
+                  <a:solidFill>
+                    <a:sysClr val="windowText" lastClr="000000"/>
+                  </a:solidFill>
+                  <a:latin typeface="Segoe UI" pitchFamily="34" charset="0"/>
+                  <a:cs typeface="Segoe UI" pitchFamily="34" charset="0"/>
+                </a:rPr>
+                <a:t>The list is ordered alphabetically ascending.</a:t>
               </a:r>
             </a:p>
           </p:txBody>
@@ -21816,7 +21837,7 @@
           </p:style>
           <p:txBody>
             <a:bodyPr lIns="91440" tIns="137160" rIns="91440" bIns="45720" rtlCol="0" anchor="t" anchorCtr="0">
-              <a:normAutofit/>
+              <a:normAutofit lnSpcReduction="10000"/>
             </a:bodyPr>
             <a:lstStyle/>
             <a:p>
@@ -21828,27 +21849,7 @@
                   <a:latin typeface="Segoe UI" pitchFamily="34" charset="0"/>
                   <a:cs typeface="Segoe UI" pitchFamily="34" charset="0"/>
                 </a:rPr>
-                <a:t>Always </a:t>
-              </a:r>
-              <a:r>
-                <a:rPr lang="en-US" sz="1200" dirty="0" err="1">
-                  <a:solidFill>
-                    <a:sysClr val="windowText" lastClr="000000"/>
-                  </a:solidFill>
-                  <a:latin typeface="Segoe UI" pitchFamily="34" charset="0"/>
-                  <a:cs typeface="Segoe UI" pitchFamily="34" charset="0"/>
-                </a:rPr>
-                <a:t>visibile</a:t>
-              </a:r>
-              <a:r>
-                <a:rPr lang="en-US" sz="1200" dirty="0">
-                  <a:solidFill>
-                    <a:sysClr val="windowText" lastClr="000000"/>
-                  </a:solidFill>
-                  <a:latin typeface="Segoe UI" pitchFamily="34" charset="0"/>
-                  <a:cs typeface="Segoe UI" pitchFamily="34" charset="0"/>
-                </a:rPr>
-                <a:t> when application is started.</a:t>
+                <a:t>Always visible when application is started.</a:t>
               </a:r>
             </a:p>
             <a:p>
@@ -21911,18 +21912,19 @@
                   <a:latin typeface="Segoe UI" pitchFamily="34" charset="0"/>
                   <a:cs typeface="Segoe UI" pitchFamily="34" charset="0"/>
                 </a:rPr>
-                <a:t>First element of the list is </a:t>
+                <a:t>The list is ordered alphabetically ascending.</a:t>
               </a:r>
-              <a:r>
-                <a:rPr lang="en-US" sz="1200" dirty="0" err="1">
-                  <a:solidFill>
-                    <a:sysClr val="windowText" lastClr="000000"/>
-                  </a:solidFill>
-                  <a:latin typeface="Segoe UI" pitchFamily="34" charset="0"/>
-                  <a:cs typeface="Segoe UI" pitchFamily="34" charset="0"/>
-                </a:rPr>
-                <a:t>allways</a:t>
-              </a:r>
+            </a:p>
+            <a:p>
+              <a:endParaRPr lang="en-US" sz="1200" dirty="0">
+                <a:solidFill>
+                  <a:sysClr val="windowText" lastClr="000000"/>
+                </a:solidFill>
+                <a:latin typeface="Segoe UI" pitchFamily="34" charset="0"/>
+                <a:cs typeface="Segoe UI" pitchFamily="34" charset="0"/>
+              </a:endParaRPr>
+            </a:p>
+            <a:p>
               <a:r>
                 <a:rPr lang="en-US" sz="1200" dirty="0">
                   <a:solidFill>
@@ -21931,7 +21933,7 @@
                   <a:latin typeface="Segoe UI" pitchFamily="34" charset="0"/>
                   <a:cs typeface="Segoe UI" pitchFamily="34" charset="0"/>
                 </a:rPr>
-                <a:t> selected when the view is initialized or filter was changed.</a:t>
+                <a:t>First element of the list is always selected when the view is initialized or filter was changed.</a:t>
               </a:r>
             </a:p>
             <a:p>
@@ -28897,199 +28899,199 @@
 
 <file path=customXml/item1.xml><?xml version="1.0" encoding="utf-8"?>
 <Control xmlns="http://schemas.microsoft.com/VisualStudio/2011/storyboarding/control">
-  <Id Name="System.Storyboarding.Common.Button" Revision="1" Stencil="System.Storyboarding.Common" StencilVersion="0.1"/>
+  <Id Name="System.Storyboarding.Common.Text" Revision="1" Stencil="System.Storyboarding.Common" StencilVersion="0.1"/>
 </Control>
 </file>
 
 <file path=customXml/item10.xml><?xml version="1.0" encoding="utf-8"?>
 <Control xmlns="http://schemas.microsoft.com/VisualStudio/2011/storyboarding/control">
-  <Id Name="System.Storyboarding.Common.Text" Revision="1" Stencil="System.Storyboarding.Common" StencilVersion="0.1"/>
+  <Id Name="System.Storyboarding.Common.TextInput" Revision="1" Stencil="System.Storyboarding.Common" StencilVersion="0.1"/>
 </Control>
 </file>
 
 <file path=customXml/item100.xml><?xml version="1.0" encoding="utf-8"?>
 <Control xmlns="http://schemas.microsoft.com/VisualStudio/2011/storyboarding/control">
-  <Id Name="System.Storyboarding.Annotation.StickyNote" Revision="1" Stencil="System.Storyboarding.Annotation" StencilVersion="0.1"/>
+  <Id Name="System.Storyboarding.Common.Text" Revision="1" Stencil="System.Storyboarding.Common" StencilVersion="0.1"/>
 </Control>
 </file>
 
 <file path=customXml/item101.xml><?xml version="1.0" encoding="utf-8"?>
 <Control xmlns="http://schemas.microsoft.com/VisualStudio/2011/storyboarding/control">
-  <Id Name="System.Storyboarding.Common.Text" Revision="1" Stencil="System.Storyboarding.Common" StencilVersion="0.1"/>
+  <Id Name="System.Storyboarding.Common.Button" Revision="1" Stencil="System.Storyboarding.Common" StencilVersion="0.1"/>
 </Control>
 </file>
 
 <file path=customXml/item102.xml><?xml version="1.0" encoding="utf-8"?>
 <Control xmlns="http://schemas.microsoft.com/VisualStudio/2011/storyboarding/control">
-  <Id Name="System.Storyboarding.Common.List" Revision="1" Stencil="System.Storyboarding.Common" StencilVersion="0.1"/>
+  <Id Name="System.Storyboarding.Common.Button" Revision="1" Stencil="System.Storyboarding.Common" StencilVersion="0.1"/>
 </Control>
 </file>
 
 <file path=customXml/item103.xml><?xml version="1.0" encoding="utf-8"?>
 <Control xmlns="http://schemas.microsoft.com/VisualStudio/2011/storyboarding/control">
-  <Id Name="System.Storyboarding.Common.ScrollbarVertical" RevisionId="68ea164d-c1de-47a5-804f-d4d1290fa524" Stencil="System.Storyboarding.Common" StencilRevisionId="68ea164d-c1de-47a5-804f-d4d1290fa524" StencilVersion="0.1"/>
+  <Id Name="System.Storyboarding.Common.Button" Revision="1" Stencil="System.Storyboarding.Common" StencilVersion="0.1"/>
 </Control>
 </file>
 
 <file path=customXml/item104.xml><?xml version="1.0" encoding="utf-8"?>
 <Control xmlns="http://schemas.microsoft.com/VisualStudio/2011/storyboarding/control">
-  <Id Name="System.Storyboarding.Common.TextInput" Revision="1" Stencil="System.Storyboarding.Common" StencilVersion="0.1"/>
+  <Id Name="System.Storyboarding.WindowsDesktop.MenuBar" Revision="1" Stencil="System.Storyboarding.WindowsDesktop" StencilVersion="0.1"/>
 </Control>
 </file>
 
 <file path=customXml/item105.xml><?xml version="1.0" encoding="utf-8"?>
 <Control xmlns="http://schemas.microsoft.com/VisualStudio/2011/storyboarding/control">
-  <Id Name="System.Storyboarding.Common.ScrollbarVertical" RevisionId="68ea164d-c1de-47a5-804f-d4d1290fa524" Stencil="System.Storyboarding.Common" StencilRevisionId="68ea164d-c1de-47a5-804f-d4d1290fa524" StencilVersion="0.1"/>
+  <Id Name="System.Storyboarding.WindowsDesktop.MenuBar" Revision="1" Stencil="System.Storyboarding.WindowsDesktop" StencilVersion="0.1"/>
 </Control>
 </file>
 
 <file path=customXml/item106.xml><?xml version="1.0" encoding="utf-8"?>
 <Control xmlns="http://schemas.microsoft.com/VisualStudio/2011/storyboarding/control">
-  <Id Name="System.Storyboarding.Common.Button" Revision="1" Stencil="System.Storyboarding.Common" StencilVersion="0.1"/>
+  <Id Name="System.Storyboarding.Common.TextInput" Revision="1" Stencil="System.Storyboarding.Common" StencilVersion="0.1"/>
 </Control>
 </file>
 
 <file path=customXml/item107.xml><?xml version="1.0" encoding="utf-8"?>
 <Control xmlns="http://schemas.microsoft.com/VisualStudio/2011/storyboarding/control">
-  <Id Name="System.Storyboarding.Common.Button" Revision="1" Stencil="System.Storyboarding.Common" StencilVersion="0.1"/>
+  <Id Name="System.Storyboarding.Common.Text" Revision="1" Stencil="System.Storyboarding.Common" StencilVersion="0.1"/>
 </Control>
 </file>
 
 <file path=customXml/item108.xml><?xml version="1.0" encoding="utf-8"?>
 <Control xmlns="http://schemas.microsoft.com/VisualStudio/2011/storyboarding/control">
-  <Id Name="System.Storyboarding.Common.Text" Revision="1" Stencil="System.Storyboarding.Common" StencilVersion="0.1"/>
+  <Id Name="System.Storyboarding.Common.Button" Revision="1" Stencil="System.Storyboarding.Common" StencilVersion="0.1"/>
 </Control>
 </file>
 
 <file path=customXml/item109.xml><?xml version="1.0" encoding="utf-8"?>
 <Control xmlns="http://schemas.microsoft.com/VisualStudio/2011/storyboarding/control">
-  <Id Name="System.Storyboarding.Common.Text" Revision="1" Stencil="System.Storyboarding.Common" StencilVersion="0.1"/>
+  <Id Name="System.Storyboarding.Annotation.StickyNote" Revision="1" Stencil="System.Storyboarding.Annotation" StencilVersion="0.1"/>
 </Control>
 </file>
 
 <file path=customXml/item11.xml><?xml version="1.0" encoding="utf-8"?>
 <Control xmlns="http://schemas.microsoft.com/VisualStudio/2011/storyboarding/control">
-  <Id Name="System.Storyboarding.Backgrounds.Window" Revision="1" Stencil="System.Storyboarding.Backgrounds" StencilVersion="0.1"/>
+  <Id Name="System.Storyboarding.WindowsDesktop.FileMenu" Revision="1" Stencil="System.Storyboarding.WindowsDesktop" StencilVersion="0.1"/>
 </Control>
 </file>
 
 <file path=customXml/item110.xml><?xml version="1.0" encoding="utf-8"?>
 <Control xmlns="http://schemas.microsoft.com/VisualStudio/2011/storyboarding/control">
-  <Id Name="System.Storyboarding.Common.List" Revision="1" Stencil="System.Storyboarding.Common" StencilVersion="0.1"/>
+  <Id Name="System.Storyboarding.Common.Button" Revision="1" Stencil="System.Storyboarding.Common" StencilVersion="0.1"/>
 </Control>
 </file>
 
 <file path=customXml/item111.xml><?xml version="1.0" encoding="utf-8"?>
 <Control xmlns="http://schemas.microsoft.com/VisualStudio/2011/storyboarding/control">
-  <Id Name="System.Storyboarding.Common.Text" Revision="1" Stencil="System.Storyboarding.Common" StencilVersion="0.1"/>
+  <Id Name="System.Storyboarding.Common.List" Revision="1" Stencil="System.Storyboarding.Common" StencilVersion="0.1"/>
 </Control>
 </file>
 
 <file path=customXml/item112.xml><?xml version="1.0" encoding="utf-8"?>
 <Control xmlns="http://schemas.microsoft.com/VisualStudio/2011/storyboarding/control">
-  <Id Name="System.Storyboarding.Common.TextInput" Revision="1" Stencil="System.Storyboarding.Common" StencilVersion="0.1"/>
+  <Id Name="System.Storyboarding.Common.Text" Revision="1" Stencil="System.Storyboarding.Common" StencilVersion="0.1"/>
 </Control>
 </file>
 
 <file path=customXml/item113.xml><?xml version="1.0" encoding="utf-8"?>
 <Control xmlns="http://schemas.microsoft.com/VisualStudio/2011/storyboarding/control">
-  <Id Name="System.Storyboarding.Common.DatePicker" Revision="1" Stencil="System.Storyboarding.Common" StencilVersion="0.1"/>
+  <Id Name="System.Storyboarding.Common.Text" Revision="1" Stencil="System.Storyboarding.Common" StencilVersion="0.1"/>
 </Control>
 </file>
 
 <file path=customXml/item114.xml><?xml version="1.0" encoding="utf-8"?>
 <Control xmlns="http://schemas.microsoft.com/VisualStudio/2011/storyboarding/control">
-  <Id Name="System.Storyboarding.Common.ScrollbarVertical" RevisionId="68ea164d-c1de-47a5-804f-d4d1290fa524" Stencil="System.Storyboarding.Common" StencilRevisionId="68ea164d-c1de-47a5-804f-d4d1290fa524" StencilVersion="0.1"/>
+  <Id Name="System.Storyboarding.Common.Text" Revision="1" Stencil="System.Storyboarding.Common" StencilVersion="0.1"/>
 </Control>
 </file>
 
 <file path=customXml/item115.xml><?xml version="1.0" encoding="utf-8"?>
 <Control xmlns="http://schemas.microsoft.com/VisualStudio/2011/storyboarding/control">
-  <Id Name="System.Storyboarding.Common.Text" Revision="1" Stencil="System.Storyboarding.Common" StencilVersion="0.1"/>
+  <Id Name="System.Storyboarding.Common.ScrollbarVertical" RevisionId="68ea164d-c1de-47a5-804f-d4d1290fa524" Stencil="System.Storyboarding.Common" StencilRevisionId="68ea164d-c1de-47a5-804f-d4d1290fa524" StencilVersion="0.1"/>
 </Control>
 </file>
 
 <file path=customXml/item116.xml><?xml version="1.0" encoding="utf-8"?>
 <Control xmlns="http://schemas.microsoft.com/VisualStudio/2011/storyboarding/control">
-  <Id Name="System.Storyboarding.Common.ScrollbarVertical" RevisionId="68ea164d-c1de-47a5-804f-d4d1290fa524" Stencil="System.Storyboarding.Common" StencilRevisionId="68ea164d-c1de-47a5-804f-d4d1290fa524" StencilVersion="0.1"/>
+  <Id Name="System.Storyboarding.Backgrounds.Window" Revision="1" Stencil="System.Storyboarding.Backgrounds" StencilVersion="0.1"/>
 </Control>
 </file>
 
 <file path=customXml/item117.xml><?xml version="1.0" encoding="utf-8"?>
 <Control xmlns="http://schemas.microsoft.com/VisualStudio/2011/storyboarding/control">
-  <Id Name="System.Storyboarding.Common.Button" Revision="1" Stencil="System.Storyboarding.Common" StencilVersion="0.1"/>
+  <Id Name="System.Storyboarding.Common.Text" Revision="1" Stencil="System.Storyboarding.Common" StencilVersion="0.1"/>
 </Control>
 </file>
 
 <file path=customXml/item118.xml><?xml version="1.0" encoding="utf-8"?>
 <Control xmlns="http://schemas.microsoft.com/VisualStudio/2011/storyboarding/control">
-  <Id Name="System.Storyboarding.WindowsDesktop.MenuBar" Revision="1" Stencil="System.Storyboarding.WindowsDesktop" StencilVersion="0.1"/>
+  <Id Name="System.Storyboarding.Common.Text" Revision="1" Stencil="System.Storyboarding.Common" StencilVersion="0.1"/>
 </Control>
 </file>
 
 <file path=customXml/item119.xml><?xml version="1.0" encoding="utf-8"?>
 <Control xmlns="http://schemas.microsoft.com/VisualStudio/2011/storyboarding/control">
-  <Id Name="System.Storyboarding.Common.Button" Revision="1" Stencil="System.Storyboarding.Common" StencilVersion="0.1"/>
+  <Id Name="System.Storyboarding.Common.Text" Revision="1" Stencil="System.Storyboarding.Common" StencilVersion="0.1"/>
 </Control>
 </file>
 
 <file path=customXml/item12.xml><?xml version="1.0" encoding="utf-8"?>
 <Control xmlns="http://schemas.microsoft.com/VisualStudio/2011/storyboarding/control">
-  <Id Name="System.Storyboarding.Common.TextInput" Revision="1" Stencil="System.Storyboarding.Common" StencilVersion="0.1"/>
+  <Id Name="System.Storyboarding.Common.Button" Revision="1" Stencil="System.Storyboarding.Common" StencilVersion="0.1"/>
 </Control>
 </file>
 
 <file path=customXml/item120.xml><?xml version="1.0" encoding="utf-8"?>
 <Control xmlns="http://schemas.microsoft.com/VisualStudio/2011/storyboarding/control">
-  <Id Name="System.Storyboarding.Common.Button" Revision="1" Stencil="System.Storyboarding.Common" StencilVersion="0.1"/>
+  <Id Name="System.Storyboarding.WindowsDesktop.MenuBar" Revision="1" Stencil="System.Storyboarding.WindowsDesktop" StencilVersion="0.1"/>
 </Control>
 </file>
 
 <file path=customXml/item121.xml><?xml version="1.0" encoding="utf-8"?>
 <Control xmlns="http://schemas.microsoft.com/VisualStudio/2011/storyboarding/control">
-  <Id Name="System.Storyboarding.Common.Text" Revision="1" Stencil="System.Storyboarding.Common" StencilVersion="0.1"/>
+  <Id Name="System.Storyboarding.Common.DatePicker" Revision="1" Stencil="System.Storyboarding.Common" StencilVersion="0.1"/>
 </Control>
 </file>
 
 <file path=customXml/item122.xml><?xml version="1.0" encoding="utf-8"?>
 <Control xmlns="http://schemas.microsoft.com/VisualStudio/2011/storyboarding/control">
-  <Id Name="System.Storyboarding.Common.TextArea" Revision="1" Stencil="System.Storyboarding.Common" StencilVersion="0.1"/>
+  <Id Name="System.Storyboarding.Annotation.StickyNote" Revision="1" Stencil="System.Storyboarding.Annotation" StencilVersion="0.1"/>
 </Control>
 </file>
 
 <file path=customXml/item123.xml><?xml version="1.0" encoding="utf-8"?>
 <Control xmlns="http://schemas.microsoft.com/VisualStudio/2011/storyboarding/control">
-  <Id Name="System.Storyboarding.Annotation.StickyNote" Revision="1" Stencil="System.Storyboarding.Annotation" StencilVersion="0.1"/>
+  <Id Name="System.Storyboarding.Common.ScrollbarVertical" RevisionId="68ea164d-c1de-47a5-804f-d4d1290fa524" Stencil="System.Storyboarding.Common" StencilRevisionId="68ea164d-c1de-47a5-804f-d4d1290fa524" StencilVersion="0.1"/>
 </Control>
 </file>
 
 <file path=customXml/item124.xml><?xml version="1.0" encoding="utf-8"?>
 <Control xmlns="http://schemas.microsoft.com/VisualStudio/2011/storyboarding/control">
-  <Id Name="System.Storyboarding.WindowsDesktop.MenuBar" Revision="1" Stencil="System.Storyboarding.WindowsDesktop" StencilVersion="0.1"/>
+  <Id Name="System.Storyboarding.Common.TextInput" Revision="1" Stencil="System.Storyboarding.Common" StencilVersion="0.1"/>
 </Control>
 </file>
 
 <file path=customXml/item125.xml><?xml version="1.0" encoding="utf-8"?>
 <Control xmlns="http://schemas.microsoft.com/VisualStudio/2011/storyboarding/control">
-  <Id Name="System.Storyboarding.Common.Text" Revision="1" Stencil="System.Storyboarding.Common" StencilVersion="0.1"/>
+  <Id Name="System.Storyboarding.Common.DropdownBox" Revision="1" Stencil="System.Storyboarding.Common" StencilVersion="0.1"/>
 </Control>
 </file>
 
 <file path=customXml/item126.xml><?xml version="1.0" encoding="utf-8"?>
 <Control xmlns="http://schemas.microsoft.com/VisualStudio/2011/storyboarding/control">
-  <Id Name="System.Storyboarding.Common.TextInput" Revision="1" Stencil="System.Storyboarding.Common" StencilVersion="0.1"/>
+  <Id Name="System.Storyboarding.Common.Button" Revision="1" Stencil="System.Storyboarding.Common" StencilVersion="0.1"/>
 </Control>
 </file>
 
 <file path=customXml/item127.xml><?xml version="1.0" encoding="utf-8"?>
 <Control xmlns="http://schemas.microsoft.com/VisualStudio/2011/storyboarding/control">
-  <Id Name="System.Storyboarding.Common.Button" Revision="1" Stencil="System.Storyboarding.Common" StencilVersion="0.1"/>
+  <Id Name="System.Storyboarding.Common.Text" Revision="1" Stencil="System.Storyboarding.Common" StencilVersion="0.1"/>
 </Control>
 </file>
 
 <file path=customXml/item128.xml><?xml version="1.0" encoding="utf-8"?>
 <Control xmlns="http://schemas.microsoft.com/VisualStudio/2011/storyboarding/control">
-  <Id Name="System.Storyboarding.WindowsDesktop.MenuBar" Revision="1" Stencil="System.Storyboarding.WindowsDesktop" StencilVersion="0.1"/>
+  <Id Name="System.Storyboarding.Common.Button" Revision="1" Stencil="System.Storyboarding.Common" StencilVersion="0.1"/>
 </Control>
 </file>
 
@@ -29101,97 +29103,97 @@
 
 <file path=customXml/item13.xml><?xml version="1.0" encoding="utf-8"?>
 <Control xmlns="http://schemas.microsoft.com/VisualStudio/2011/storyboarding/control">
-  <Id Name="System.Storyboarding.Common.List" Revision="1" Stencil="System.Storyboarding.Common" StencilVersion="0.1"/>
+  <Id Name="System.Storyboarding.Backgrounds.Window" Revision="1" Stencil="System.Storyboarding.Backgrounds" StencilVersion="0.1"/>
 </Control>
 </file>
 
 <file path=customXml/item130.xml><?xml version="1.0" encoding="utf-8"?>
 <Control xmlns="http://schemas.microsoft.com/VisualStudio/2011/storyboarding/control">
-  <Id Name="System.Storyboarding.Common.Button" Revision="1" Stencil="System.Storyboarding.Common" StencilVersion="0.1"/>
+  <Id Name="System.Storyboarding.Common.Text" Revision="1" Stencil="System.Storyboarding.Common" StencilVersion="0.1"/>
 </Control>
 </file>
 
 <file path=customXml/item131.xml><?xml version="1.0" encoding="utf-8"?>
 <Control xmlns="http://schemas.microsoft.com/VisualStudio/2011/storyboarding/control">
-  <Id Name="System.Storyboarding.Common.Text" Revision="1" Stencil="System.Storyboarding.Common" StencilVersion="0.1"/>
+  <Id Name="System.Storyboarding.Backgrounds.Window" Revision="1" Stencil="System.Storyboarding.Backgrounds" StencilVersion="0.1"/>
 </Control>
 </file>
 
 <file path=customXml/item14.xml><?xml version="1.0" encoding="utf-8"?>
 <Control xmlns="http://schemas.microsoft.com/VisualStudio/2011/storyboarding/control">
-  <Id Name="System.Storyboarding.Common.Text" Revision="1" Stencil="System.Storyboarding.Common" StencilVersion="0.1"/>
+  <Id Name="System.Storyboarding.Common.Button" Revision="1" Stencil="System.Storyboarding.Common" StencilVersion="0.1"/>
 </Control>
 </file>
 
 <file path=customXml/item15.xml><?xml version="1.0" encoding="utf-8"?>
 <Control xmlns="http://schemas.microsoft.com/VisualStudio/2011/storyboarding/control">
-  <Id Name="System.Storyboarding.WindowsDesktop.MenuBar" Revision="1" Stencil="System.Storyboarding.WindowsDesktop" StencilVersion="0.1"/>
+  <Id Name="System.Storyboarding.Common.ScrollbarVertical" RevisionId="68ea164d-c1de-47a5-804f-d4d1290fa524" Stencil="System.Storyboarding.Common" StencilRevisionId="68ea164d-c1de-47a5-804f-d4d1290fa524" StencilVersion="0.1"/>
 </Control>
 </file>
 
 <file path=customXml/item16.xml><?xml version="1.0" encoding="utf-8"?>
 <Control xmlns="http://schemas.microsoft.com/VisualStudio/2011/storyboarding/control">
-  <Id Name="System.Storyboarding.WindowsDesktop.FileMenu" Revision="1" Stencil="System.Storyboarding.WindowsDesktop" StencilVersion="0.1"/>
+  <Id Name="System.Storyboarding.Backgrounds.Window" Revision="1" Stencil="System.Storyboarding.Backgrounds" StencilVersion="0.1"/>
 </Control>
 </file>
 
 <file path=customXml/item17.xml><?xml version="1.0" encoding="utf-8"?>
 <Control xmlns="http://schemas.microsoft.com/VisualStudio/2011/storyboarding/control">
-  <Id Name="System.Storyboarding.Common.ScrollbarVertical" RevisionId="68ea164d-c1de-47a5-804f-d4d1290fa524" Stencil="System.Storyboarding.Common" StencilRevisionId="68ea164d-c1de-47a5-804f-d4d1290fa524" StencilVersion="0.1"/>
+  <Id Name="System.Storyboarding.Common.TextArea" Revision="1" Stencil="System.Storyboarding.Common" StencilVersion="0.1"/>
 </Control>
 </file>
 
 <file path=customXml/item18.xml><?xml version="1.0" encoding="utf-8"?>
 <Control xmlns="http://schemas.microsoft.com/VisualStudio/2011/storyboarding/control">
-  <Id Name="System.Storyboarding.Annotation.StickyNote" Revision="1" Stencil="System.Storyboarding.Annotation" StencilVersion="0.1"/>
+  <Id Name="System.Storyboarding.Common.Button" Revision="1" Stencil="System.Storyboarding.Common" StencilVersion="0.1"/>
 </Control>
 </file>
 
 <file path=customXml/item19.xml><?xml version="1.0" encoding="utf-8"?>
 <Control xmlns="http://schemas.microsoft.com/VisualStudio/2011/storyboarding/control">
-  <Id Name="System.Storyboarding.Backgrounds.Window" Revision="1" Stencil="System.Storyboarding.Backgrounds" StencilVersion="0.1"/>
+  <Id Name="System.Storyboarding.Common.Button" Revision="1" Stencil="System.Storyboarding.Common" StencilVersion="0.1"/>
 </Control>
 </file>
 
 <file path=customXml/item2.xml><?xml version="1.0" encoding="utf-8"?>
 <Control xmlns="http://schemas.microsoft.com/VisualStudio/2011/storyboarding/control">
-  <Id Name="System.Storyboarding.WindowsDesktop.MenuBar" Revision="1" Stencil="System.Storyboarding.WindowsDesktop" StencilVersion="0.1"/>
+  <Id Name="System.Storyboarding.Common.Button" Revision="1" Stencil="System.Storyboarding.Common" StencilVersion="0.1"/>
 </Control>
 </file>
 
 <file path=customXml/item20.xml><?xml version="1.0" encoding="utf-8"?>
 <Control xmlns="http://schemas.microsoft.com/VisualStudio/2011/storyboarding/control">
-  <Id Name="System.Storyboarding.Common.TextInput" Revision="1" Stencil="System.Storyboarding.Common" StencilVersion="0.1"/>
+  <Id Name="System.Storyboarding.Common.List" Revision="1" Stencil="System.Storyboarding.Common" StencilVersion="0.1"/>
 </Control>
 </file>
 
 <file path=customXml/item21.xml><?xml version="1.0" encoding="utf-8"?>
 <Control xmlns="http://schemas.microsoft.com/VisualStudio/2011/storyboarding/control">
-  <Id Name="System.Storyboarding.Common.List" Revision="1" Stencil="System.Storyboarding.Common" StencilVersion="0.1"/>
+  <Id Name="System.Storyboarding.Annotation.StickyNote" Revision="1" Stencil="System.Storyboarding.Annotation" StencilVersion="0.1"/>
 </Control>
 </file>
 
 <file path=customXml/item22.xml><?xml version="1.0" encoding="utf-8"?>
 <Control xmlns="http://schemas.microsoft.com/VisualStudio/2011/storyboarding/control">
-  <Id Name="System.Storyboarding.Common.Text" Revision="1" Stencil="System.Storyboarding.Common" StencilVersion="0.1"/>
+  <Id Name="System.Storyboarding.WindowsDesktop.MenuBar" Revision="1" Stencil="System.Storyboarding.WindowsDesktop" StencilVersion="0.1"/>
 </Control>
 </file>
 
 <file path=customXml/item23.xml><?xml version="1.0" encoding="utf-8"?>
 <Control xmlns="http://schemas.microsoft.com/VisualStudio/2011/storyboarding/control">
-  <Id Name="System.Storyboarding.Backgrounds.Window" Revision="1" Stencil="System.Storyboarding.Backgrounds" StencilVersion="0.1"/>
+  <Id Name="System.Storyboarding.Common.Text" Revision="1" Stencil="System.Storyboarding.Common" StencilVersion="0.1"/>
 </Control>
 </file>
 
 <file path=customXml/item24.xml><?xml version="1.0" encoding="utf-8"?>
 <Control xmlns="http://schemas.microsoft.com/VisualStudio/2011/storyboarding/control">
-  <Id Name="System.Storyboarding.Common.TextInput" Revision="1" Stencil="System.Storyboarding.Common" StencilVersion="0.1"/>
+  <Id Name="System.Storyboarding.Common.Button" Revision="1" Stencil="System.Storyboarding.Common" StencilVersion="0.1"/>
 </Control>
 </file>
 
 <file path=customXml/item25.xml><?xml version="1.0" encoding="utf-8"?>
 <Control xmlns="http://schemas.microsoft.com/VisualStudio/2011/storyboarding/control">
-  <Id Name="System.Storyboarding.WindowsDesktop.MenuBar" Revision="1" Stencil="System.Storyboarding.WindowsDesktop" StencilVersion="0.1"/>
+  <Id Name="System.Storyboarding.Common.Text" Revision="1" Stencil="System.Storyboarding.Common" StencilVersion="0.1"/>
 </Control>
 </file>
 
@@ -29209,61 +29211,61 @@
 
 <file path=customXml/item28.xml><?xml version="1.0" encoding="utf-8"?>
 <Control xmlns="http://schemas.microsoft.com/VisualStudio/2011/storyboarding/control">
-  <Id Name="System.Storyboarding.Annotation.StickyNote" Revision="1" Stencil="System.Storyboarding.Annotation" StencilVersion="0.1"/>
+  <Id Name="System.Storyboarding.Backgrounds.Window" Revision="1" Stencil="System.Storyboarding.Backgrounds" StencilVersion="0.1"/>
 </Control>
 </file>
 
 <file path=customXml/item29.xml><?xml version="1.0" encoding="utf-8"?>
 <Control xmlns="http://schemas.microsoft.com/VisualStudio/2011/storyboarding/control">
-  <Id Name="System.Storyboarding.WindowsDesktop.MenuBar" Revision="1" Stencil="System.Storyboarding.WindowsDesktop" StencilVersion="0.1"/>
+  <Id Name="System.Storyboarding.Annotation.StickyNote" Revision="1" Stencil="System.Storyboarding.Annotation" StencilVersion="0.1"/>
 </Control>
 </file>
 
 <file path=customXml/item3.xml><?xml version="1.0" encoding="utf-8"?>
 <Control xmlns="http://schemas.microsoft.com/VisualStudio/2011/storyboarding/control">
-  <Id Name="System.Storyboarding.Backgrounds.Window" Revision="1" Stencil="System.Storyboarding.Backgrounds" StencilVersion="0.1"/>
+  <Id Name="System.Storyboarding.Common.List" Revision="1" Stencil="System.Storyboarding.Common" StencilVersion="0.1"/>
 </Control>
 </file>
 
 <file path=customXml/item30.xml><?xml version="1.0" encoding="utf-8"?>
 <Control xmlns="http://schemas.microsoft.com/VisualStudio/2011/storyboarding/control">
-  <Id Name="System.Storyboarding.Common.Text" Revision="1" Stencil="System.Storyboarding.Common" StencilVersion="0.1"/>
+  <Id Name="System.Storyboarding.Backgrounds.Window" Revision="1" Stencil="System.Storyboarding.Backgrounds" StencilVersion="0.1"/>
 </Control>
 </file>
 
 <file path=customXml/item31.xml><?xml version="1.0" encoding="utf-8"?>
 <Control xmlns="http://schemas.microsoft.com/VisualStudio/2011/storyboarding/control">
-  <Id Name="System.Storyboarding.Common.ScrollbarVertical" RevisionId="68ea164d-c1de-47a5-804f-d4d1290fa524" Stencil="System.Storyboarding.Common" StencilRevisionId="68ea164d-c1de-47a5-804f-d4d1290fa524" StencilVersion="0.1"/>
+  <Id Name="System.Storyboarding.Annotation.StickyNote" Revision="1" Stencil="System.Storyboarding.Annotation" StencilVersion="0.1"/>
 </Control>
 </file>
 
 <file path=customXml/item32.xml><?xml version="1.0" encoding="utf-8"?>
 <Control xmlns="http://schemas.microsoft.com/VisualStudio/2011/storyboarding/control">
-  <Id Name="System.Storyboarding.Common.Button" Revision="1" Stencil="System.Storyboarding.Common" StencilVersion="0.1"/>
+  <Id Name="System.Storyboarding.Common.DatePicker" Revision="1" Stencil="System.Storyboarding.Common" StencilVersion="0.1"/>
 </Control>
 </file>
 
 <file path=customXml/item33.xml><?xml version="1.0" encoding="utf-8"?>
 <Control xmlns="http://schemas.microsoft.com/VisualStudio/2011/storyboarding/control">
-  <Id Name="System.Storyboarding.Common.Text" Revision="1" Stencil="System.Storyboarding.Common" StencilVersion="0.1"/>
+  <Id Name="System.Storyboarding.WindowsDesktop.MenuBar" Revision="1" Stencil="System.Storyboarding.WindowsDesktop" StencilVersion="0.1"/>
 </Control>
 </file>
 
 <file path=customXml/item34.xml><?xml version="1.0" encoding="utf-8"?>
 <Control xmlns="http://schemas.microsoft.com/VisualStudio/2011/storyboarding/control">
-  <Id Name="System.Storyboarding.Common.TextInput" Revision="1" Stencil="System.Storyboarding.Common" StencilVersion="0.1"/>
+  <Id Name="System.Storyboarding.WindowsDesktop.FileMenu" Revision="1" Stencil="System.Storyboarding.WindowsDesktop" StencilVersion="0.1"/>
 </Control>
 </file>
 
 <file path=customXml/item35.xml><?xml version="1.0" encoding="utf-8"?>
 <Control xmlns="http://schemas.microsoft.com/VisualStudio/2011/storyboarding/control">
-  <Id Name="System.Storyboarding.Common.Text" Revision="1" Stencil="System.Storyboarding.Common" StencilVersion="0.1"/>
+  <Id Name="System.Storyboarding.Common.TextInput" Revision="1" Stencil="System.Storyboarding.Common" StencilVersion="0.1"/>
 </Control>
 </file>
 
 <file path=customXml/item36.xml><?xml version="1.0" encoding="utf-8"?>
 <Control xmlns="http://schemas.microsoft.com/VisualStudio/2011/storyboarding/control">
-  <Id Name="System.Storyboarding.Common.ScrollbarVertical" RevisionId="68ea164d-c1de-47a5-804f-d4d1290fa524" Stencil="System.Storyboarding.Common" StencilRevisionId="68ea164d-c1de-47a5-804f-d4d1290fa524" StencilVersion="0.1"/>
+  <Id Name="System.Storyboarding.Common.TextInput" Revision="1" Stencil="System.Storyboarding.Common" StencilVersion="0.1"/>
 </Control>
 </file>
 
@@ -29275,7 +29277,7 @@
 
 <file path=customXml/item38.xml><?xml version="1.0" encoding="utf-8"?>
 <Control xmlns="http://schemas.microsoft.com/VisualStudio/2011/storyboarding/control">
-  <Id Name="System.Storyboarding.Common.Text" Revision="1" Stencil="System.Storyboarding.Common" StencilVersion="0.1"/>
+  <Id Name="System.Storyboarding.WindowsDesktop.MenuBar" Revision="1" Stencil="System.Storyboarding.WindowsDesktop" StencilVersion="0.1"/>
 </Control>
 </file>
 
@@ -29287,7 +29289,7 @@
 
 <file path=customXml/item4.xml><?xml version="1.0" encoding="utf-8"?>
 <Control xmlns="http://schemas.microsoft.com/VisualStudio/2011/storyboarding/control">
-  <Id Name="System.Storyboarding.Common.TextInput" Revision="1" Stencil="System.Storyboarding.Common" StencilVersion="0.1"/>
+  <Id Name="System.Storyboarding.Annotation.StickyNote" Revision="1" Stencil="System.Storyboarding.Annotation" StencilVersion="0.1"/>
 </Control>
 </file>
 
@@ -29299,7 +29301,7 @@
 
 <file path=customXml/item41.xml><?xml version="1.0" encoding="utf-8"?>
 <Control xmlns="http://schemas.microsoft.com/VisualStudio/2011/storyboarding/control">
-  <Id Name="System.Storyboarding.WindowsDesktop.FileMenu" Revision="1" Stencil="System.Storyboarding.WindowsDesktop" StencilVersion="0.1"/>
+  <Id Name="System.Storyboarding.Common.Text" Revision="1" Stencil="System.Storyboarding.Common" StencilVersion="0.1"/>
 </Control>
 </file>
 
@@ -29311,25 +29313,25 @@
 
 <file path=customXml/item43.xml><?xml version="1.0" encoding="utf-8"?>
 <Control xmlns="http://schemas.microsoft.com/VisualStudio/2011/storyboarding/control">
-  <Id Name="System.Storyboarding.Backgrounds.Window" Revision="1" Stencil="System.Storyboarding.Backgrounds" StencilVersion="0.1"/>
+  <Id Name="System.Storyboarding.Common.ScrollbarVertical" RevisionId="68ea164d-c1de-47a5-804f-d4d1290fa524" Stencil="System.Storyboarding.Common" StencilRevisionId="68ea164d-c1de-47a5-804f-d4d1290fa524" StencilVersion="0.1"/>
 </Control>
 </file>
 
 <file path=customXml/item44.xml><?xml version="1.0" encoding="utf-8"?>
 <Control xmlns="http://schemas.microsoft.com/VisualStudio/2011/storyboarding/control">
-  <Id Name="System.Storyboarding.Common.DropdownBox" Revision="1" Stencil="System.Storyboarding.Common" StencilVersion="0.1"/>
+  <Id Name="System.Storyboarding.Common.ScrollbarVertical" RevisionId="68ea164d-c1de-47a5-804f-d4d1290fa524" Stencil="System.Storyboarding.Common" StencilRevisionId="68ea164d-c1de-47a5-804f-d4d1290fa524" StencilVersion="0.1"/>
 </Control>
 </file>
 
 <file path=customXml/item45.xml><?xml version="1.0" encoding="utf-8"?>
 <Control xmlns="http://schemas.microsoft.com/VisualStudio/2011/storyboarding/control">
-  <Id Name="System.Storyboarding.Common.Button" Revision="1" Stencil="System.Storyboarding.Common" StencilVersion="0.1"/>
+  <Id Name="System.Storyboarding.Common.Text" Revision="1" Stencil="System.Storyboarding.Common" StencilVersion="0.1"/>
 </Control>
 </file>
 
 <file path=customXml/item46.xml><?xml version="1.0" encoding="utf-8"?>
 <Control xmlns="http://schemas.microsoft.com/VisualStudio/2011/storyboarding/control">
-  <Id Name="System.Storyboarding.Common.Text" Revision="1" Stencil="System.Storyboarding.Common" StencilVersion="0.1"/>
+  <Id Name="System.Storyboarding.Common.ScrollbarVertical" RevisionId="68ea164d-c1de-47a5-804f-d4d1290fa524" Stencil="System.Storyboarding.Common" StencilRevisionId="68ea164d-c1de-47a5-804f-d4d1290fa524" StencilVersion="0.1"/>
 </Control>
 </file>
 
@@ -29341,49 +29343,49 @@
 
 <file path=customXml/item48.xml><?xml version="1.0" encoding="utf-8"?>
 <Control xmlns="http://schemas.microsoft.com/VisualStudio/2011/storyboarding/control">
-  <Id Name="System.Storyboarding.Annotation.StickyNote" Revision="1" Stencil="System.Storyboarding.Annotation" StencilVersion="0.1"/>
+  <Id Name="System.Storyboarding.Common.Text" Revision="1" Stencil="System.Storyboarding.Common" StencilVersion="0.1"/>
 </Control>
 </file>
 
 <file path=customXml/item49.xml><?xml version="1.0" encoding="utf-8"?>
 <Control xmlns="http://schemas.microsoft.com/VisualStudio/2011/storyboarding/control">
-  <Id Name="System.Storyboarding.Backgrounds.Window" Revision="1" Stencil="System.Storyboarding.Backgrounds" StencilVersion="0.1"/>
+  <Id Name="System.Storyboarding.Common.TextInput" Revision="1" Stencil="System.Storyboarding.Common" StencilVersion="0.1"/>
 </Control>
 </file>
 
 <file path=customXml/item5.xml><?xml version="1.0" encoding="utf-8"?>
 <Control xmlns="http://schemas.microsoft.com/VisualStudio/2011/storyboarding/control">
-  <Id Name="System.Storyboarding.Common.Text" Revision="1" Stencil="System.Storyboarding.Common" StencilVersion="0.1"/>
+  <Id Name="System.Storyboarding.WindowsDesktop.MenuBar" Revision="1" Stencil="System.Storyboarding.WindowsDesktop" StencilVersion="0.1"/>
 </Control>
 </file>
 
 <file path=customXml/item50.xml><?xml version="1.0" encoding="utf-8"?>
 <Control xmlns="http://schemas.microsoft.com/VisualStudio/2011/storyboarding/control">
-  <Id Name="System.Storyboarding.Common.Text" Revision="1" Stencil="System.Storyboarding.Common" StencilVersion="0.1"/>
+  <Id Name="System.Storyboarding.WindowsDesktop.FileMenu" Revision="1" Stencil="System.Storyboarding.WindowsDesktop" StencilVersion="0.1"/>
 </Control>
 </file>
 
 <file path=customXml/item51.xml><?xml version="1.0" encoding="utf-8"?>
 <Control xmlns="http://schemas.microsoft.com/VisualStudio/2011/storyboarding/control">
-  <Id Name="System.Storyboarding.Common.Button" Revision="1" Stencil="System.Storyboarding.Common" StencilVersion="0.1"/>
+  <Id Name="System.Storyboarding.Backgrounds.Window" Revision="1" Stencil="System.Storyboarding.Backgrounds" StencilVersion="0.1"/>
 </Control>
 </file>
 
 <file path=customXml/item52.xml><?xml version="1.0" encoding="utf-8"?>
 <Control xmlns="http://schemas.microsoft.com/VisualStudio/2011/storyboarding/control">
-  <Id Name="System.Storyboarding.Common.TextInput" Revision="1" Stencil="System.Storyboarding.Common" StencilVersion="0.1"/>
+  <Id Name="System.Storyboarding.Common.List" Revision="1" Stencil="System.Storyboarding.Common" StencilVersion="0.1"/>
 </Control>
 </file>
 
 <file path=customXml/item53.xml><?xml version="1.0" encoding="utf-8"?>
 <Control xmlns="http://schemas.microsoft.com/VisualStudio/2011/storyboarding/control">
-  <Id Name="System.Storyboarding.Backgrounds.Window" Revision="1" Stencil="System.Storyboarding.Backgrounds" StencilVersion="0.1"/>
+  <Id Name="System.Storyboarding.WindowsDesktop.MenuBar" Revision="1" Stencil="System.Storyboarding.WindowsDesktop" StencilVersion="0.1"/>
 </Control>
 </file>
 
 <file path=customXml/item54.xml><?xml version="1.0" encoding="utf-8"?>
 <Control xmlns="http://schemas.microsoft.com/VisualStudio/2011/storyboarding/control">
-  <Id Name="System.Storyboarding.Backgrounds.Window" Revision="1" Stencil="System.Storyboarding.Backgrounds" StencilVersion="0.1"/>
+  <Id Name="System.Storyboarding.Common.Text" Revision="1" Stencil="System.Storyboarding.Common" StencilVersion="0.1"/>
 </Control>
 </file>
 
@@ -29395,7 +29397,7 @@
 
 <file path=customXml/item56.xml><?xml version="1.0" encoding="utf-8"?>
 <Control xmlns="http://schemas.microsoft.com/VisualStudio/2011/storyboarding/control">
-  <Id Name="System.Storyboarding.WindowsDesktop.MenuBar" Revision="1" Stencil="System.Storyboarding.WindowsDesktop" StencilVersion="0.1"/>
+  <Id Name="System.Storyboarding.Common.Text" Revision="1" Stencil="System.Storyboarding.Common" StencilVersion="0.1"/>
 </Control>
 </file>
 
@@ -29407,91 +29409,91 @@
 
 <file path=customXml/item58.xml><?xml version="1.0" encoding="utf-8"?>
 <Control xmlns="http://schemas.microsoft.com/VisualStudio/2011/storyboarding/control">
-  <Id Name="System.Storyboarding.Common.TextArea" Revision="1" Stencil="System.Storyboarding.Common" StencilVersion="0.1"/>
+  <Id Name="System.Storyboarding.Common.TextInput" Revision="1" Stencil="System.Storyboarding.Common" StencilVersion="0.1"/>
 </Control>
 </file>
 
 <file path=customXml/item59.xml><?xml version="1.0" encoding="utf-8"?>
 <Control xmlns="http://schemas.microsoft.com/VisualStudio/2011/storyboarding/control">
-  <Id Name="System.Storyboarding.Annotation.StickyNote" Revision="1" Stencil="System.Storyboarding.Annotation" StencilVersion="0.1"/>
+  <Id Name="System.Storyboarding.Common.Text" Revision="1" Stencil="System.Storyboarding.Common" StencilVersion="0.1"/>
 </Control>
 </file>
 
 <file path=customXml/item6.xml><?xml version="1.0" encoding="utf-8"?>
 <Control xmlns="http://schemas.microsoft.com/VisualStudio/2011/storyboarding/control">
-  <Id Name="System.Storyboarding.Backgrounds.Window" Revision="1" Stencil="System.Storyboarding.Backgrounds" StencilVersion="0.1"/>
+  <Id Name="System.Storyboarding.Annotation.StickyNote" Revision="1" Stencil="System.Storyboarding.Annotation" StencilVersion="0.1"/>
 </Control>
 </file>
 
 <file path=customXml/item60.xml><?xml version="1.0" encoding="utf-8"?>
 <Control xmlns="http://schemas.microsoft.com/VisualStudio/2011/storyboarding/control">
-  <Id Name="System.Storyboarding.WindowsDesktop.MenuBar" Revision="1" Stencil="System.Storyboarding.WindowsDesktop" StencilVersion="0.1"/>
+  <Id Name="System.Storyboarding.Common.Button" Revision="1" Stencil="System.Storyboarding.Common" StencilVersion="0.1"/>
 </Control>
 </file>
 
 <file path=customXml/item61.xml><?xml version="1.0" encoding="utf-8"?>
 <Control xmlns="http://schemas.microsoft.com/VisualStudio/2011/storyboarding/control">
-  <Id Name="System.Storyboarding.Common.Text" Revision="1" Stencil="System.Storyboarding.Common" StencilVersion="0.1"/>
+  <Id Name="System.Storyboarding.Backgrounds.Window" Revision="1" Stencil="System.Storyboarding.Backgrounds" StencilVersion="0.1"/>
 </Control>
 </file>
 
 <file path=customXml/item62.xml><?xml version="1.0" encoding="utf-8"?>
 <Control xmlns="http://schemas.microsoft.com/VisualStudio/2011/storyboarding/control">
-  <Id Name="System.Storyboarding.Common.List" Revision="1" Stencil="System.Storyboarding.Common" StencilVersion="0.1"/>
+  <Id Name="System.Storyboarding.WindowsDesktop.MenuBar" Revision="1" Stencil="System.Storyboarding.WindowsDesktop" StencilVersion="0.1"/>
 </Control>
 </file>
 
 <file path=customXml/item63.xml><?xml version="1.0" encoding="utf-8"?>
 <Control xmlns="http://schemas.microsoft.com/VisualStudio/2011/storyboarding/control">
-  <Id Name="System.Storyboarding.Annotation.StickyNote" Revision="1" Stencil="System.Storyboarding.Annotation" StencilVersion="0.1"/>
+  <Id Name="System.Storyboarding.Backgrounds.Window" Revision="1" Stencil="System.Storyboarding.Backgrounds" StencilVersion="0.1"/>
 </Control>
 </file>
 
 <file path=customXml/item64.xml><?xml version="1.0" encoding="utf-8"?>
 <Control xmlns="http://schemas.microsoft.com/VisualStudio/2011/storyboarding/control">
-  <Id Name="System.Storyboarding.Backgrounds.Window" Revision="1" Stencil="System.Storyboarding.Backgrounds" StencilVersion="0.1"/>
+  <Id Name="System.Storyboarding.Annotation.StickyNote" Revision="1" Stencil="System.Storyboarding.Annotation" StencilVersion="0.1"/>
 </Control>
 </file>
 
 <file path=customXml/item65.xml><?xml version="1.0" encoding="utf-8"?>
 <Control xmlns="http://schemas.microsoft.com/VisualStudio/2011/storyboarding/control">
-  <Id Name="System.Storyboarding.WindowsDesktop.MenuBar" Revision="1" Stencil="System.Storyboarding.WindowsDesktop" StencilVersion="0.1"/>
+  <Id Name="System.Storyboarding.Common.ScrollbarVertical" RevisionId="68ea164d-c1de-47a5-804f-d4d1290fa524" Stencil="System.Storyboarding.Common" StencilRevisionId="68ea164d-c1de-47a5-804f-d4d1290fa524" StencilVersion="0.1"/>
 </Control>
 </file>
 
 <file path=customXml/item66.xml><?xml version="1.0" encoding="utf-8"?>
 <Control xmlns="http://schemas.microsoft.com/VisualStudio/2011/storyboarding/control">
-  <Id Name="System.Storyboarding.Annotation.StickyNote" Revision="1" Stencil="System.Storyboarding.Annotation" StencilVersion="0.1"/>
+  <Id Name="System.Storyboarding.Backgrounds.Window" Revision="1" Stencil="System.Storyboarding.Backgrounds" StencilVersion="0.1"/>
 </Control>
 </file>
 
 <file path=customXml/item67.xml><?xml version="1.0" encoding="utf-8"?>
 <Control xmlns="http://schemas.microsoft.com/VisualStudio/2011/storyboarding/control">
-  <Id Name="System.Storyboarding.Common.ScrollbarVertical" RevisionId="68ea164d-c1de-47a5-804f-d4d1290fa524" Stencil="System.Storyboarding.Common" StencilRevisionId="68ea164d-c1de-47a5-804f-d4d1290fa524" StencilVersion="0.1"/>
+  <Id Name="System.Storyboarding.Common.Text" Revision="1" Stencil="System.Storyboarding.Common" StencilVersion="0.1"/>
 </Control>
 </file>
 
 <file path=customXml/item68.xml><?xml version="1.0" encoding="utf-8"?>
 <Control xmlns="http://schemas.microsoft.com/VisualStudio/2011/storyboarding/control">
-  <Id Name="System.Storyboarding.Common.TextInput" Revision="1" Stencil="System.Storyboarding.Common" StencilVersion="0.1"/>
+  <Id Name="System.Storyboarding.Common.Button" Revision="1" Stencil="System.Storyboarding.Common" StencilVersion="0.1"/>
 </Control>
 </file>
 
 <file path=customXml/item69.xml><?xml version="1.0" encoding="utf-8"?>
 <Control xmlns="http://schemas.microsoft.com/VisualStudio/2011/storyboarding/control">
-  <Id Name="System.Storyboarding.Annotation.StickyNote" Revision="1" Stencil="System.Storyboarding.Annotation" StencilVersion="0.1"/>
+  <Id Name="System.Storyboarding.Common.ScrollbarVertical" RevisionId="68ea164d-c1de-47a5-804f-d4d1290fa524" Stencil="System.Storyboarding.Common" StencilRevisionId="68ea164d-c1de-47a5-804f-d4d1290fa524" StencilVersion="0.1"/>
 </Control>
 </file>
 
 <file path=customXml/item7.xml><?xml version="1.0" encoding="utf-8"?>
 <Control xmlns="http://schemas.microsoft.com/VisualStudio/2011/storyboarding/control">
-  <Id Name="System.Storyboarding.Common.Button" Revision="1" Stencil="System.Storyboarding.Common" StencilVersion="0.1"/>
+  <Id Name="System.Storyboarding.Common.TextInput" Revision="1" Stencil="System.Storyboarding.Common" StencilVersion="0.1"/>
 </Control>
 </file>
 
 <file path=customXml/item70.xml><?xml version="1.0" encoding="utf-8"?>
 <Control xmlns="http://schemas.microsoft.com/VisualStudio/2011/storyboarding/control">
-  <Id Name="System.Storyboarding.WindowsDesktop.MenuBar" Revision="1" Stencil="System.Storyboarding.WindowsDesktop" StencilVersion="0.1"/>
+  <Id Name="System.Storyboarding.Common.Button" Revision="1" Stencil="System.Storyboarding.Common" StencilVersion="0.1"/>
 </Control>
 </file>
 
@@ -29509,37 +29511,37 @@
 
 <file path=customXml/item73.xml><?xml version="1.0" encoding="utf-8"?>
 <Control xmlns="http://schemas.microsoft.com/VisualStudio/2011/storyboarding/control">
-  <Id Name="System.Storyboarding.Common.Text" Revision="1" Stencil="System.Storyboarding.Common" StencilVersion="0.1"/>
+  <Id Name="System.Storyboarding.Common.ScrollbarVertical" RevisionId="68ea164d-c1de-47a5-804f-d4d1290fa524" Stencil="System.Storyboarding.Common" StencilRevisionId="68ea164d-c1de-47a5-804f-d4d1290fa524" StencilVersion="0.1"/>
 </Control>
 </file>
 
 <file path=customXml/item74.xml><?xml version="1.0" encoding="utf-8"?>
 <Control xmlns="http://schemas.microsoft.com/VisualStudio/2011/storyboarding/control">
-  <Id Name="System.Storyboarding.Common.Button" Revision="1" Stencil="System.Storyboarding.Common" StencilVersion="0.1"/>
+  <Id Name="System.Storyboarding.Common.DropdownBox" Revision="1" Stencil="System.Storyboarding.Common" StencilVersion="0.1"/>
 </Control>
 </file>
 
 <file path=customXml/item75.xml><?xml version="1.0" encoding="utf-8"?>
 <Control xmlns="http://schemas.microsoft.com/VisualStudio/2011/storyboarding/control">
-  <Id Name="System.Storyboarding.Common.Text" Revision="1" Stencil="System.Storyboarding.Common" StencilVersion="0.1"/>
+  <Id Name="System.Storyboarding.Common.TextInput" Revision="1" Stencil="System.Storyboarding.Common" StencilVersion="0.1"/>
 </Control>
 </file>
 
 <file path=customXml/item76.xml><?xml version="1.0" encoding="utf-8"?>
 <Control xmlns="http://schemas.microsoft.com/VisualStudio/2011/storyboarding/control">
-  <Id Name="System.Storyboarding.Common.DropdownBox" Revision="1" Stencil="System.Storyboarding.Common" StencilVersion="0.1"/>
+  <Id Name="System.Storyboarding.WindowsDesktop.MenuBar" Revision="1" Stencil="System.Storyboarding.WindowsDesktop" StencilVersion="0.1"/>
 </Control>
 </file>
 
 <file path=customXml/item77.xml><?xml version="1.0" encoding="utf-8"?>
 <Control xmlns="http://schemas.microsoft.com/VisualStudio/2011/storyboarding/control">
-  <Id Name="System.Storyboarding.Common.DatePicker" Revision="1" Stencil="System.Storyboarding.Common" StencilVersion="0.1"/>
+  <Id Name="System.Storyboarding.WindowsDesktop.MenuBar" Revision="1" Stencil="System.Storyboarding.WindowsDesktop" StencilVersion="0.1"/>
 </Control>
 </file>
 
 <file path=customXml/item78.xml><?xml version="1.0" encoding="utf-8"?>
 <Control xmlns="http://schemas.microsoft.com/VisualStudio/2011/storyboarding/control">
-  <Id Name="System.Storyboarding.Common.Button" Revision="1" Stencil="System.Storyboarding.Common" StencilVersion="0.1"/>
+  <Id Name="System.Storyboarding.Common.Text" Revision="1" Stencil="System.Storyboarding.Common" StencilVersion="0.1"/>
 </Control>
 </file>
 
@@ -29551,61 +29553,61 @@
 
 <file path=customXml/item8.xml><?xml version="1.0" encoding="utf-8"?>
 <Control xmlns="http://schemas.microsoft.com/VisualStudio/2011/storyboarding/control">
-  <Id Name="System.Storyboarding.Common.DropdownBox" Revision="1" Stencil="System.Storyboarding.Common" StencilVersion="0.1"/>
+  <Id Name="System.Storyboarding.Common.DatePicker" Revision="1" Stencil="System.Storyboarding.Common" StencilVersion="0.1"/>
 </Control>
 </file>
 
 <file path=customXml/item80.xml><?xml version="1.0" encoding="utf-8"?>
 <Control xmlns="http://schemas.microsoft.com/VisualStudio/2011/storyboarding/control">
-  <Id Name="System.Storyboarding.WindowsDesktop.FileMenu" Revision="1" Stencil="System.Storyboarding.WindowsDesktop" StencilVersion="0.1"/>
+  <Id Name="System.Storyboarding.Backgrounds.Window" Revision="1" Stencil="System.Storyboarding.Backgrounds" StencilVersion="0.1"/>
 </Control>
 </file>
 
 <file path=customXml/item81.xml><?xml version="1.0" encoding="utf-8"?>
 <Control xmlns="http://schemas.microsoft.com/VisualStudio/2011/storyboarding/control">
-  <Id Name="System.Storyboarding.Backgrounds.Window" Revision="1" Stencil="System.Storyboarding.Backgrounds" StencilVersion="0.1"/>
+  <Id Name="System.Storyboarding.Common.TextInput" Revision="1" Stencil="System.Storyboarding.Common" StencilVersion="0.1"/>
 </Control>
 </file>
 
 <file path=customXml/item82.xml><?xml version="1.0" encoding="utf-8"?>
 <Control xmlns="http://schemas.microsoft.com/VisualStudio/2011/storyboarding/control">
-  <Id Name="System.Storyboarding.Common.ScrollbarVertical" RevisionId="68ea164d-c1de-47a5-804f-d4d1290fa524" Stencil="System.Storyboarding.Common" StencilRevisionId="68ea164d-c1de-47a5-804f-d4d1290fa524" StencilVersion="0.1"/>
+  <Id Name="System.Storyboarding.WindowsDesktop.FileMenu" Revision="1" Stencil="System.Storyboarding.WindowsDesktop" StencilVersion="0.1"/>
 </Control>
 </file>
 
 <file path=customXml/item83.xml><?xml version="1.0" encoding="utf-8"?>
 <Control xmlns="http://schemas.microsoft.com/VisualStudio/2011/storyboarding/control">
-  <Id Name="System.Storyboarding.Common.Text" Revision="1" Stencil="System.Storyboarding.Common" StencilVersion="0.1"/>
+  <Id Name="System.Storyboarding.Common.List" Revision="1" Stencil="System.Storyboarding.Common" StencilVersion="0.1"/>
 </Control>
 </file>
 
 <file path=customXml/item84.xml><?xml version="1.0" encoding="utf-8"?>
 <Control xmlns="http://schemas.microsoft.com/VisualStudio/2011/storyboarding/control">
-  <Id Name="System.Storyboarding.Common.DatePicker" Revision="1" Stencil="System.Storyboarding.Common" StencilVersion="0.1"/>
+  <Id Name="System.Storyboarding.Common.Text" Revision="1" Stencil="System.Storyboarding.Common" StencilVersion="0.1"/>
 </Control>
 </file>
 
 <file path=customXml/item85.xml><?xml version="1.0" encoding="utf-8"?>
 <Control xmlns="http://schemas.microsoft.com/VisualStudio/2011/storyboarding/control">
-  <Id Name="System.Storyboarding.Common.TextInput" Revision="1" Stencil="System.Storyboarding.Common" StencilVersion="0.1"/>
+  <Id Name="System.Storyboarding.Common.TextArea" Revision="1" Stencil="System.Storyboarding.Common" StencilVersion="0.1"/>
 </Control>
 </file>
 
 <file path=customXml/item86.xml><?xml version="1.0" encoding="utf-8"?>
 <Control xmlns="http://schemas.microsoft.com/VisualStudio/2011/storyboarding/control">
-  <Id Name="System.Storyboarding.Common.TextInput" Revision="1" Stencil="System.Storyboarding.Common" StencilVersion="0.1"/>
+  <Id Name="System.Storyboarding.Common.Button" Revision="1" Stencil="System.Storyboarding.Common" StencilVersion="0.1"/>
 </Control>
 </file>
 
 <file path=customXml/item87.xml><?xml version="1.0" encoding="utf-8"?>
 <Control xmlns="http://schemas.microsoft.com/VisualStudio/2011/storyboarding/control">
-  <Id Name="System.Storyboarding.Common.Button" Revision="1" Stencil="System.Storyboarding.Common" StencilVersion="0.1"/>
+  <Id Name="System.Storyboarding.Common.TextInput" Revision="1" Stencil="System.Storyboarding.Common" StencilVersion="0.1"/>
 </Control>
 </file>
 
 <file path=customXml/item88.xml><?xml version="1.0" encoding="utf-8"?>
 <Control xmlns="http://schemas.microsoft.com/VisualStudio/2011/storyboarding/control">
-  <Id Name="System.Storyboarding.Common.Text" Revision="1" Stencil="System.Storyboarding.Common" StencilVersion="0.1"/>
+  <Id Name="System.Storyboarding.Common.TextArea" Revision="1" Stencil="System.Storyboarding.Common" StencilVersion="0.1"/>
 </Control>
 </file>
 
@@ -29617,13 +29619,13 @@
 
 <file path=customXml/item9.xml><?xml version="1.0" encoding="utf-8"?>
 <Control xmlns="http://schemas.microsoft.com/VisualStudio/2011/storyboarding/control">
-  <Id Name="System.Storyboarding.Common.TextArea" Revision="1" Stencil="System.Storyboarding.Common" StencilVersion="0.1"/>
+  <Id Name="System.Storyboarding.Common.List" Revision="1" Stencil="System.Storyboarding.Common" StencilVersion="0.1"/>
 </Control>
 </file>
 
 <file path=customXml/item90.xml><?xml version="1.0" encoding="utf-8"?>
 <Control xmlns="http://schemas.microsoft.com/VisualStudio/2011/storyboarding/control">
-  <Id Name="System.Storyboarding.Common.Button" Revision="1" Stencil="System.Storyboarding.Common" StencilVersion="0.1"/>
+  <Id Name="System.Storyboarding.Annotation.StickyNote" Revision="1" Stencil="System.Storyboarding.Annotation" StencilVersion="0.1"/>
 </Control>
 </file>
 
@@ -29635,19 +29637,19 @@
 
 <file path=customXml/item92.xml><?xml version="1.0" encoding="utf-8"?>
 <Control xmlns="http://schemas.microsoft.com/VisualStudio/2011/storyboarding/control">
-  <Id Name="System.Storyboarding.Common.Button" Revision="1" Stencil="System.Storyboarding.Common" StencilVersion="0.1"/>
+  <Id Name="System.Storyboarding.Common.Text" Revision="1" Stencil="System.Storyboarding.Common" StencilVersion="0.1"/>
 </Control>
 </file>
 
 <file path=customXml/item93.xml><?xml version="1.0" encoding="utf-8"?>
 <Control xmlns="http://schemas.microsoft.com/VisualStudio/2011/storyboarding/control">
-  <Id Name="System.Storyboarding.Common.Button" Revision="1" Stencil="System.Storyboarding.Common" StencilVersion="0.1"/>
+  <Id Name="System.Storyboarding.Common.TextInput" Revision="1" Stencil="System.Storyboarding.Common" StencilVersion="0.1"/>
 </Control>
 </file>
 
 <file path=customXml/item94.xml><?xml version="1.0" encoding="utf-8"?>
 <Control xmlns="http://schemas.microsoft.com/VisualStudio/2011/storyboarding/control">
-  <Id Name="System.Storyboarding.WindowsDesktop.FileMenu" Revision="1" Stencil="System.Storyboarding.WindowsDesktop" StencilVersion="0.1"/>
+  <Id Name="System.Storyboarding.Common.Text" Revision="1" Stencil="System.Storyboarding.Common" StencilVersion="0.1"/>
 </Control>
 </file>
 
@@ -29659,7 +29661,7 @@
 
 <file path=customXml/item96.xml><?xml version="1.0" encoding="utf-8"?>
 <Control xmlns="http://schemas.microsoft.com/VisualStudio/2011/storyboarding/control">
-  <Id Name="System.Storyboarding.Common.TextInput" Revision="1" Stencil="System.Storyboarding.Common" StencilVersion="0.1"/>
+  <Id Name="System.Storyboarding.Common.DropdownBox" Revision="1" Stencil="System.Storyboarding.Common" StencilVersion="0.1"/>
 </Control>
 </file>
 
@@ -29671,18 +29673,18 @@
 
 <file path=customXml/item98.xml><?xml version="1.0" encoding="utf-8"?>
 <Control xmlns="http://schemas.microsoft.com/VisualStudio/2011/storyboarding/control">
-  <Id Name="System.Storyboarding.Common.Text" Revision="1" Stencil="System.Storyboarding.Common" StencilVersion="0.1"/>
+  <Id Name="System.Storyboarding.Common.TextInput" Revision="1" Stencil="System.Storyboarding.Common" StencilVersion="0.1"/>
 </Control>
 </file>
 
 <file path=customXml/item99.xml><?xml version="1.0" encoding="utf-8"?>
 <Control xmlns="http://schemas.microsoft.com/VisualStudio/2011/storyboarding/control">
-  <Id Name="System.Storyboarding.Common.List" Revision="1" Stencil="System.Storyboarding.Common" StencilVersion="0.1"/>
+  <Id Name="System.Storyboarding.Common.Button" Revision="1" Stencil="System.Storyboarding.Common" StencilVersion="0.1"/>
 </Control>
 </file>
 
 <file path=customXml/itemProps1.xml><?xml version="1.0" encoding="utf-8"?>
-<ds:datastoreItem xmlns:ds="http://schemas.openxmlformats.org/officeDocument/2006/customXml" ds:itemID="{1C290400-708A-4F32-B6CE-889254E6BB2E}">
+<ds:datastoreItem xmlns:ds="http://schemas.openxmlformats.org/officeDocument/2006/customXml" ds:itemID="{9B42172C-79E0-4D31-98DB-D4B2B95D22D1}">
   <ds:schemaRefs>
     <ds:schemaRef ds:uri="http://schemas.microsoft.com/VisualStudio/2011/storyboarding/control"/>
   </ds:schemaRefs>
@@ -29690,7 +29692,7 @@
 </file>
 
 <file path=customXml/itemProps10.xml><?xml version="1.0" encoding="utf-8"?>
-<ds:datastoreItem xmlns:ds="http://schemas.openxmlformats.org/officeDocument/2006/customXml" ds:itemID="{EBE58D0C-2830-4249-A8DE-740FAE27E447}">
+<ds:datastoreItem xmlns:ds="http://schemas.openxmlformats.org/officeDocument/2006/customXml" ds:itemID="{DF613E62-89E5-49BD-8B86-B43B79479696}">
   <ds:schemaRefs>
     <ds:schemaRef ds:uri="http://schemas.microsoft.com/VisualStudio/2011/storyboarding/control"/>
   </ds:schemaRefs>
@@ -29698,6 +29700,198 @@
 </file>
 
 <file path=customXml/itemProps100.xml><?xml version="1.0" encoding="utf-8"?>
+<ds:datastoreItem xmlns:ds="http://schemas.openxmlformats.org/officeDocument/2006/customXml" ds:itemID="{9113EAFC-E473-486D-9A05-18CDD81498C7}">
+  <ds:schemaRefs>
+    <ds:schemaRef ds:uri="http://schemas.microsoft.com/VisualStudio/2011/storyboarding/control"/>
+  </ds:schemaRefs>
+</ds:datastoreItem>
+</file>
+
+<file path=customXml/itemProps101.xml><?xml version="1.0" encoding="utf-8"?>
+<ds:datastoreItem xmlns:ds="http://schemas.openxmlformats.org/officeDocument/2006/customXml" ds:itemID="{1B93EB85-367C-4534-81B3-669A88F24C03}">
+  <ds:schemaRefs>
+    <ds:schemaRef ds:uri="http://schemas.microsoft.com/VisualStudio/2011/storyboarding/control"/>
+  </ds:schemaRefs>
+</ds:datastoreItem>
+</file>
+
+<file path=customXml/itemProps102.xml><?xml version="1.0" encoding="utf-8"?>
+<ds:datastoreItem xmlns:ds="http://schemas.openxmlformats.org/officeDocument/2006/customXml" ds:itemID="{CFAE03B5-3C04-4BF7-AFAE-7B6872285014}">
+  <ds:schemaRefs>
+    <ds:schemaRef ds:uri="http://schemas.microsoft.com/VisualStudio/2011/storyboarding/control"/>
+  </ds:schemaRefs>
+</ds:datastoreItem>
+</file>
+
+<file path=customXml/itemProps103.xml><?xml version="1.0" encoding="utf-8"?>
+<ds:datastoreItem xmlns:ds="http://schemas.openxmlformats.org/officeDocument/2006/customXml" ds:itemID="{208FB6D1-8CEC-40AC-B779-73F8475BFAF6}">
+  <ds:schemaRefs>
+    <ds:schemaRef ds:uri="http://schemas.microsoft.com/VisualStudio/2011/storyboarding/control"/>
+  </ds:schemaRefs>
+</ds:datastoreItem>
+</file>
+
+<file path=customXml/itemProps104.xml><?xml version="1.0" encoding="utf-8"?>
+<ds:datastoreItem xmlns:ds="http://schemas.openxmlformats.org/officeDocument/2006/customXml" ds:itemID="{D03F7A5D-C76B-4088-9A4C-531AC82D4C8A}">
+  <ds:schemaRefs>
+    <ds:schemaRef ds:uri="http://schemas.microsoft.com/VisualStudio/2011/storyboarding/control"/>
+  </ds:schemaRefs>
+</ds:datastoreItem>
+</file>
+
+<file path=customXml/itemProps105.xml><?xml version="1.0" encoding="utf-8"?>
+<ds:datastoreItem xmlns:ds="http://schemas.openxmlformats.org/officeDocument/2006/customXml" ds:itemID="{311A9357-256A-41F4-AE75-7C855A39E077}">
+  <ds:schemaRefs>
+    <ds:schemaRef ds:uri="http://schemas.microsoft.com/VisualStudio/2011/storyboarding/control"/>
+  </ds:schemaRefs>
+</ds:datastoreItem>
+</file>
+
+<file path=customXml/itemProps106.xml><?xml version="1.0" encoding="utf-8"?>
+<ds:datastoreItem xmlns:ds="http://schemas.openxmlformats.org/officeDocument/2006/customXml" ds:itemID="{E9529ED8-ECF1-4169-A657-873F7E2D79D4}">
+  <ds:schemaRefs>
+    <ds:schemaRef ds:uri="http://schemas.microsoft.com/VisualStudio/2011/storyboarding/control"/>
+  </ds:schemaRefs>
+</ds:datastoreItem>
+</file>
+
+<file path=customXml/itemProps107.xml><?xml version="1.0" encoding="utf-8"?>
+<ds:datastoreItem xmlns:ds="http://schemas.openxmlformats.org/officeDocument/2006/customXml" ds:itemID="{C44AA76C-0712-4F96-ABF5-D4724DF8A5E6}">
+  <ds:schemaRefs>
+    <ds:schemaRef ds:uri="http://schemas.microsoft.com/VisualStudio/2011/storyboarding/control"/>
+  </ds:schemaRefs>
+</ds:datastoreItem>
+</file>
+
+<file path=customXml/itemProps108.xml><?xml version="1.0" encoding="utf-8"?>
+<ds:datastoreItem xmlns:ds="http://schemas.openxmlformats.org/officeDocument/2006/customXml" ds:itemID="{2415F925-55B2-4C00-9C22-0B759C9F5441}">
+  <ds:schemaRefs>
+    <ds:schemaRef ds:uri="http://schemas.microsoft.com/VisualStudio/2011/storyboarding/control"/>
+  </ds:schemaRefs>
+</ds:datastoreItem>
+</file>
+
+<file path=customXml/itemProps109.xml><?xml version="1.0" encoding="utf-8"?>
+<ds:datastoreItem xmlns:ds="http://schemas.openxmlformats.org/officeDocument/2006/customXml" ds:itemID="{8B83D7D3-2CCF-447D-B462-D22A3B87D672}">
+  <ds:schemaRefs>
+    <ds:schemaRef ds:uri="http://schemas.microsoft.com/VisualStudio/2011/storyboarding/control"/>
+  </ds:schemaRefs>
+</ds:datastoreItem>
+</file>
+
+<file path=customXml/itemProps11.xml><?xml version="1.0" encoding="utf-8"?>
+<ds:datastoreItem xmlns:ds="http://schemas.openxmlformats.org/officeDocument/2006/customXml" ds:itemID="{6401E635-2C4B-4237-B325-6FE04D00F31A}">
+  <ds:schemaRefs>
+    <ds:schemaRef ds:uri="http://schemas.microsoft.com/VisualStudio/2011/storyboarding/control"/>
+  </ds:schemaRefs>
+</ds:datastoreItem>
+</file>
+
+<file path=customXml/itemProps110.xml><?xml version="1.0" encoding="utf-8"?>
+<ds:datastoreItem xmlns:ds="http://schemas.openxmlformats.org/officeDocument/2006/customXml" ds:itemID="{62135A7A-6CBC-420C-AE63-12B3AA96B443}">
+  <ds:schemaRefs>
+    <ds:schemaRef ds:uri="http://schemas.microsoft.com/VisualStudio/2011/storyboarding/control"/>
+  </ds:schemaRefs>
+</ds:datastoreItem>
+</file>
+
+<file path=customXml/itemProps111.xml><?xml version="1.0" encoding="utf-8"?>
+<ds:datastoreItem xmlns:ds="http://schemas.openxmlformats.org/officeDocument/2006/customXml" ds:itemID="{05E9ACCB-10F4-4E4A-865B-263A490C6703}">
+  <ds:schemaRefs>
+    <ds:schemaRef ds:uri="http://schemas.microsoft.com/VisualStudio/2011/storyboarding/control"/>
+  </ds:schemaRefs>
+</ds:datastoreItem>
+</file>
+
+<file path=customXml/itemProps112.xml><?xml version="1.0" encoding="utf-8"?>
+<ds:datastoreItem xmlns:ds="http://schemas.openxmlformats.org/officeDocument/2006/customXml" ds:itemID="{231D95D8-1070-4440-83D5-6DCEFFBEDADF}">
+  <ds:schemaRefs>
+    <ds:schemaRef ds:uri="http://schemas.microsoft.com/VisualStudio/2011/storyboarding/control"/>
+  </ds:schemaRefs>
+</ds:datastoreItem>
+</file>
+
+<file path=customXml/itemProps113.xml><?xml version="1.0" encoding="utf-8"?>
+<ds:datastoreItem xmlns:ds="http://schemas.openxmlformats.org/officeDocument/2006/customXml" ds:itemID="{CBD399AF-34BE-46B7-B03E-5D463F55DB14}">
+  <ds:schemaRefs>
+    <ds:schemaRef ds:uri="http://schemas.microsoft.com/VisualStudio/2011/storyboarding/control"/>
+  </ds:schemaRefs>
+</ds:datastoreItem>
+</file>
+
+<file path=customXml/itemProps114.xml><?xml version="1.0" encoding="utf-8"?>
+<ds:datastoreItem xmlns:ds="http://schemas.openxmlformats.org/officeDocument/2006/customXml" ds:itemID="{36CC1AC8-B31A-4401-9BB0-330EB0CB7C4E}">
+  <ds:schemaRefs>
+    <ds:schemaRef ds:uri="http://schemas.microsoft.com/VisualStudio/2011/storyboarding/control"/>
+  </ds:schemaRefs>
+</ds:datastoreItem>
+</file>
+
+<file path=customXml/itemProps115.xml><?xml version="1.0" encoding="utf-8"?>
+<ds:datastoreItem xmlns:ds="http://schemas.openxmlformats.org/officeDocument/2006/customXml" ds:itemID="{A43B68ED-C766-4FB1-940C-87743424070A}">
+  <ds:schemaRefs>
+    <ds:schemaRef ds:uri="http://schemas.microsoft.com/VisualStudio/2011/storyboarding/control"/>
+  </ds:schemaRefs>
+</ds:datastoreItem>
+</file>
+
+<file path=customXml/itemProps116.xml><?xml version="1.0" encoding="utf-8"?>
+<ds:datastoreItem xmlns:ds="http://schemas.openxmlformats.org/officeDocument/2006/customXml" ds:itemID="{BB707719-AEF7-45A2-ACBD-B694F20C9FEF}">
+  <ds:schemaRefs>
+    <ds:schemaRef ds:uri="http://schemas.microsoft.com/VisualStudio/2011/storyboarding/control"/>
+  </ds:schemaRefs>
+</ds:datastoreItem>
+</file>
+
+<file path=customXml/itemProps117.xml><?xml version="1.0" encoding="utf-8"?>
+<ds:datastoreItem xmlns:ds="http://schemas.openxmlformats.org/officeDocument/2006/customXml" ds:itemID="{A5E10392-F138-4775-8CDF-2D37BE1C0731}">
+  <ds:schemaRefs>
+    <ds:schemaRef ds:uri="http://schemas.microsoft.com/VisualStudio/2011/storyboarding/control"/>
+  </ds:schemaRefs>
+</ds:datastoreItem>
+</file>
+
+<file path=customXml/itemProps118.xml><?xml version="1.0" encoding="utf-8"?>
+<ds:datastoreItem xmlns:ds="http://schemas.openxmlformats.org/officeDocument/2006/customXml" ds:itemID="{AC69AB27-8DA4-4794-89F6-0222024A38B1}">
+  <ds:schemaRefs>
+    <ds:schemaRef ds:uri="http://schemas.microsoft.com/VisualStudio/2011/storyboarding/control"/>
+  </ds:schemaRefs>
+</ds:datastoreItem>
+</file>
+
+<file path=customXml/itemProps119.xml><?xml version="1.0" encoding="utf-8"?>
+<ds:datastoreItem xmlns:ds="http://schemas.openxmlformats.org/officeDocument/2006/customXml" ds:itemID="{E89553A4-5092-4056-9C58-1EA4C1D0520C}">
+  <ds:schemaRefs>
+    <ds:schemaRef ds:uri="http://schemas.microsoft.com/VisualStudio/2011/storyboarding/control"/>
+  </ds:schemaRefs>
+</ds:datastoreItem>
+</file>
+
+<file path=customXml/itemProps12.xml><?xml version="1.0" encoding="utf-8"?>
+<ds:datastoreItem xmlns:ds="http://schemas.openxmlformats.org/officeDocument/2006/customXml" ds:itemID="{CEB1C125-6106-40BD-9836-04EF08359075}">
+  <ds:schemaRefs>
+    <ds:schemaRef ds:uri="http://schemas.microsoft.com/VisualStudio/2011/storyboarding/control"/>
+  </ds:schemaRefs>
+</ds:datastoreItem>
+</file>
+
+<file path=customXml/itemProps120.xml><?xml version="1.0" encoding="utf-8"?>
+<ds:datastoreItem xmlns:ds="http://schemas.openxmlformats.org/officeDocument/2006/customXml" ds:itemID="{1EDC6C38-A3CA-4E6E-9C60-33A7C91AA38C}">
+  <ds:schemaRefs>
+    <ds:schemaRef ds:uri="http://schemas.microsoft.com/VisualStudio/2011/storyboarding/control"/>
+  </ds:schemaRefs>
+</ds:datastoreItem>
+</file>
+
+<file path=customXml/itemProps121.xml><?xml version="1.0" encoding="utf-8"?>
+<ds:datastoreItem xmlns:ds="http://schemas.openxmlformats.org/officeDocument/2006/customXml" ds:itemID="{A77469F4-C7CF-49B6-89A1-2216DBF12A35}">
+  <ds:schemaRefs>
+    <ds:schemaRef ds:uri="http://schemas.microsoft.com/VisualStudio/2011/storyboarding/control"/>
+  </ds:schemaRefs>
+</ds:datastoreItem>
+</file>
+
+<file path=customXml/itemProps122.xml><?xml version="1.0" encoding="utf-8"?>
 <ds:datastoreItem xmlns:ds="http://schemas.openxmlformats.org/officeDocument/2006/customXml" ds:itemID="{4D2CEF5D-900B-4D13-8BB3-3F2FBB8371A1}">
   <ds:schemaRefs>
     <ds:schemaRef ds:uri="http://schemas.microsoft.com/VisualStudio/2011/storyboarding/control"/>
@@ -29705,15 +29899,143 @@
 </ds:datastoreItem>
 </file>
 
-<file path=customXml/itemProps101.xml><?xml version="1.0" encoding="utf-8"?>
-<ds:datastoreItem xmlns:ds="http://schemas.openxmlformats.org/officeDocument/2006/customXml" ds:itemID="{0414D702-B8A1-4908-83A3-7346D4446B44}">
+<file path=customXml/itemProps123.xml><?xml version="1.0" encoding="utf-8"?>
+<ds:datastoreItem xmlns:ds="http://schemas.openxmlformats.org/officeDocument/2006/customXml" ds:itemID="{4E3A0F99-5D41-42CD-ADFF-8D7F226B8324}">
   <ds:schemaRefs>
     <ds:schemaRef ds:uri="http://schemas.microsoft.com/VisualStudio/2011/storyboarding/control"/>
   </ds:schemaRefs>
 </ds:datastoreItem>
 </file>
 
-<file path=customXml/itemProps102.xml><?xml version="1.0" encoding="utf-8"?>
+<file path=customXml/itemProps124.xml><?xml version="1.0" encoding="utf-8"?>
+<ds:datastoreItem xmlns:ds="http://schemas.openxmlformats.org/officeDocument/2006/customXml" ds:itemID="{09D364F4-B5CE-41CD-9C86-F866BBA6DDBC}">
+  <ds:schemaRefs>
+    <ds:schemaRef ds:uri="http://schemas.microsoft.com/VisualStudio/2011/storyboarding/control"/>
+  </ds:schemaRefs>
+</ds:datastoreItem>
+</file>
+
+<file path=customXml/itemProps125.xml><?xml version="1.0" encoding="utf-8"?>
+<ds:datastoreItem xmlns:ds="http://schemas.openxmlformats.org/officeDocument/2006/customXml" ds:itemID="{0F5209C0-6C38-43D1-B645-38EECC490212}">
+  <ds:schemaRefs>
+    <ds:schemaRef ds:uri="http://schemas.microsoft.com/VisualStudio/2011/storyboarding/control"/>
+  </ds:schemaRefs>
+</ds:datastoreItem>
+</file>
+
+<file path=customXml/itemProps126.xml><?xml version="1.0" encoding="utf-8"?>
+<ds:datastoreItem xmlns:ds="http://schemas.openxmlformats.org/officeDocument/2006/customXml" ds:itemID="{344FE49E-E784-4E46-A759-B7A09CE3D79D}">
+  <ds:schemaRefs>
+    <ds:schemaRef ds:uri="http://schemas.microsoft.com/VisualStudio/2011/storyboarding/control"/>
+  </ds:schemaRefs>
+</ds:datastoreItem>
+</file>
+
+<file path=customXml/itemProps127.xml><?xml version="1.0" encoding="utf-8"?>
+<ds:datastoreItem xmlns:ds="http://schemas.openxmlformats.org/officeDocument/2006/customXml" ds:itemID="{F429A82E-902C-463F-BCE5-CEACECD98F61}">
+  <ds:schemaRefs>
+    <ds:schemaRef ds:uri="http://schemas.microsoft.com/VisualStudio/2011/storyboarding/control"/>
+  </ds:schemaRefs>
+</ds:datastoreItem>
+</file>
+
+<file path=customXml/itemProps128.xml><?xml version="1.0" encoding="utf-8"?>
+<ds:datastoreItem xmlns:ds="http://schemas.openxmlformats.org/officeDocument/2006/customXml" ds:itemID="{9E7BB052-76C8-48EA-A682-8A91C00B30D8}">
+  <ds:schemaRefs>
+    <ds:schemaRef ds:uri="http://schemas.microsoft.com/VisualStudio/2011/storyboarding/control"/>
+  </ds:schemaRefs>
+</ds:datastoreItem>
+</file>
+
+<file path=customXml/itemProps129.xml><?xml version="1.0" encoding="utf-8"?>
+<ds:datastoreItem xmlns:ds="http://schemas.openxmlformats.org/officeDocument/2006/customXml" ds:itemID="{AF19FD1C-AF38-4695-9E6F-7C89D1DDF47B}">
+  <ds:schemaRefs>
+    <ds:schemaRef ds:uri="http://schemas.microsoft.com/VisualStudio/2011/storyboarding/control"/>
+  </ds:schemaRefs>
+</ds:datastoreItem>
+</file>
+
+<file path=customXml/itemProps13.xml><?xml version="1.0" encoding="utf-8"?>
+<ds:datastoreItem xmlns:ds="http://schemas.openxmlformats.org/officeDocument/2006/customXml" ds:itemID="{36807AD9-FA99-4396-B268-8F5D54ECCB5B}">
+  <ds:schemaRefs>
+    <ds:schemaRef ds:uri="http://schemas.microsoft.com/VisualStudio/2011/storyboarding/control"/>
+  </ds:schemaRefs>
+</ds:datastoreItem>
+</file>
+
+<file path=customXml/itemProps130.xml><?xml version="1.0" encoding="utf-8"?>
+<ds:datastoreItem xmlns:ds="http://schemas.openxmlformats.org/officeDocument/2006/customXml" ds:itemID="{B02E87D1-67B4-47D3-A093-1EB92BDCF821}">
+  <ds:schemaRefs>
+    <ds:schemaRef ds:uri="http://schemas.microsoft.com/VisualStudio/2011/storyboarding/control"/>
+  </ds:schemaRefs>
+</ds:datastoreItem>
+</file>
+
+<file path=customXml/itemProps131.xml><?xml version="1.0" encoding="utf-8"?>
+<ds:datastoreItem xmlns:ds="http://schemas.openxmlformats.org/officeDocument/2006/customXml" ds:itemID="{9E31CF2A-CD40-4CEA-A83E-FBDEFEE09783}">
+  <ds:schemaRefs>
+    <ds:schemaRef ds:uri="http://schemas.microsoft.com/VisualStudio/2011/storyboarding/control"/>
+  </ds:schemaRefs>
+</ds:datastoreItem>
+</file>
+
+<file path=customXml/itemProps14.xml><?xml version="1.0" encoding="utf-8"?>
+<ds:datastoreItem xmlns:ds="http://schemas.openxmlformats.org/officeDocument/2006/customXml" ds:itemID="{4BCD54F3-7312-4574-A273-3F51F0A67564}">
+  <ds:schemaRefs>
+    <ds:schemaRef ds:uri="http://schemas.microsoft.com/VisualStudio/2011/storyboarding/control"/>
+  </ds:schemaRefs>
+</ds:datastoreItem>
+</file>
+
+<file path=customXml/itemProps15.xml><?xml version="1.0" encoding="utf-8"?>
+<ds:datastoreItem xmlns:ds="http://schemas.openxmlformats.org/officeDocument/2006/customXml" ds:itemID="{BA1CEC6E-37B5-48DE-8530-2E103FE14F71}">
+  <ds:schemaRefs>
+    <ds:schemaRef ds:uri="http://schemas.microsoft.com/VisualStudio/2011/storyboarding/control"/>
+  </ds:schemaRefs>
+</ds:datastoreItem>
+</file>
+
+<file path=customXml/itemProps16.xml><?xml version="1.0" encoding="utf-8"?>
+<ds:datastoreItem xmlns:ds="http://schemas.openxmlformats.org/officeDocument/2006/customXml" ds:itemID="{B08ADF9D-738E-4F16-A242-B4C819E366A5}">
+  <ds:schemaRefs>
+    <ds:schemaRef ds:uri="http://schemas.microsoft.com/VisualStudio/2011/storyboarding/control"/>
+  </ds:schemaRefs>
+</ds:datastoreItem>
+</file>
+
+<file path=customXml/itemProps17.xml><?xml version="1.0" encoding="utf-8"?>
+<ds:datastoreItem xmlns:ds="http://schemas.openxmlformats.org/officeDocument/2006/customXml" ds:itemID="{2B93C5E5-4DC3-46D8-B87C-C98BF5559628}">
+  <ds:schemaRefs>
+    <ds:schemaRef ds:uri="http://schemas.microsoft.com/VisualStudio/2011/storyboarding/control"/>
+  </ds:schemaRefs>
+</ds:datastoreItem>
+</file>
+
+<file path=customXml/itemProps18.xml><?xml version="1.0" encoding="utf-8"?>
+<ds:datastoreItem xmlns:ds="http://schemas.openxmlformats.org/officeDocument/2006/customXml" ds:itemID="{8194725C-0298-40CE-A63D-824BD1F30F6B}">
+  <ds:schemaRefs>
+    <ds:schemaRef ds:uri="http://schemas.microsoft.com/VisualStudio/2011/storyboarding/control"/>
+  </ds:schemaRefs>
+</ds:datastoreItem>
+</file>
+
+<file path=customXml/itemProps19.xml><?xml version="1.0" encoding="utf-8"?>
+<ds:datastoreItem xmlns:ds="http://schemas.openxmlformats.org/officeDocument/2006/customXml" ds:itemID="{14E57316-B59F-4AC7-ACEB-4EB40FDD8D0D}">
+  <ds:schemaRefs>
+    <ds:schemaRef ds:uri="http://schemas.microsoft.com/VisualStudio/2011/storyboarding/control"/>
+  </ds:schemaRefs>
+</ds:datastoreItem>
+</file>
+
+<file path=customXml/itemProps2.xml><?xml version="1.0" encoding="utf-8"?>
+<ds:datastoreItem xmlns:ds="http://schemas.openxmlformats.org/officeDocument/2006/customXml" ds:itemID="{B99204DE-0958-4829-B68E-38983042787A}">
+  <ds:schemaRefs>
+    <ds:schemaRef ds:uri="http://schemas.microsoft.com/VisualStudio/2011/storyboarding/control"/>
+  </ds:schemaRefs>
+</ds:datastoreItem>
+</file>
+
+<file path=customXml/itemProps20.xml><?xml version="1.0" encoding="utf-8"?>
 <ds:datastoreItem xmlns:ds="http://schemas.openxmlformats.org/officeDocument/2006/customXml" ds:itemID="{2928952C-6CEF-44EB-92AA-1376354F624A}">
   <ds:schemaRefs>
     <ds:schemaRef ds:uri="http://schemas.microsoft.com/VisualStudio/2011/storyboarding/control"/>
@@ -29721,183 +30043,7 @@
 </ds:datastoreItem>
 </file>
 
-<file path=customXml/itemProps103.xml><?xml version="1.0" encoding="utf-8"?>
-<ds:datastoreItem xmlns:ds="http://schemas.openxmlformats.org/officeDocument/2006/customXml" ds:itemID="{B86FC14E-608D-4408-A64C-21E6AEE90D98}">
-  <ds:schemaRefs>
-    <ds:schemaRef ds:uri="http://schemas.microsoft.com/VisualStudio/2011/storyboarding/control"/>
-  </ds:schemaRefs>
-</ds:datastoreItem>
-</file>
-
-<file path=customXml/itemProps104.xml><?xml version="1.0" encoding="utf-8"?>
-<ds:datastoreItem xmlns:ds="http://schemas.openxmlformats.org/officeDocument/2006/customXml" ds:itemID="{03CD57E2-38C9-4F6B-A49E-1BAA5856DBAC}">
-  <ds:schemaRefs>
-    <ds:schemaRef ds:uri="http://schemas.microsoft.com/VisualStudio/2011/storyboarding/control"/>
-  </ds:schemaRefs>
-</ds:datastoreItem>
-</file>
-
-<file path=customXml/itemProps105.xml><?xml version="1.0" encoding="utf-8"?>
-<ds:datastoreItem xmlns:ds="http://schemas.openxmlformats.org/officeDocument/2006/customXml" ds:itemID="{4E3A0F99-5D41-42CD-ADFF-8D7F226B8324}">
-  <ds:schemaRefs>
-    <ds:schemaRef ds:uri="http://schemas.microsoft.com/VisualStudio/2011/storyboarding/control"/>
-  </ds:schemaRefs>
-</ds:datastoreItem>
-</file>
-
-<file path=customXml/itemProps106.xml><?xml version="1.0" encoding="utf-8"?>
-<ds:datastoreItem xmlns:ds="http://schemas.openxmlformats.org/officeDocument/2006/customXml" ds:itemID="{10945163-6C7B-4EA4-A07E-42768A2D254A}">
-  <ds:schemaRefs>
-    <ds:schemaRef ds:uri="http://schemas.microsoft.com/VisualStudio/2011/storyboarding/control"/>
-  </ds:schemaRefs>
-</ds:datastoreItem>
-</file>
-
-<file path=customXml/itemProps107.xml><?xml version="1.0" encoding="utf-8"?>
-<ds:datastoreItem xmlns:ds="http://schemas.openxmlformats.org/officeDocument/2006/customXml" ds:itemID="{CEB1C125-6106-40BD-9836-04EF08359075}">
-  <ds:schemaRefs>
-    <ds:schemaRef ds:uri="http://schemas.microsoft.com/VisualStudio/2011/storyboarding/control"/>
-  </ds:schemaRefs>
-</ds:datastoreItem>
-</file>
-
-<file path=customXml/itemProps108.xml><?xml version="1.0" encoding="utf-8"?>
-<ds:datastoreItem xmlns:ds="http://schemas.openxmlformats.org/officeDocument/2006/customXml" ds:itemID="{AC2373A1-1AB1-4602-8A6A-0480E21041EF}">
-  <ds:schemaRefs>
-    <ds:schemaRef ds:uri="http://schemas.microsoft.com/VisualStudio/2011/storyboarding/control"/>
-  </ds:schemaRefs>
-</ds:datastoreItem>
-</file>
-
-<file path=customXml/itemProps109.xml><?xml version="1.0" encoding="utf-8"?>
-<ds:datastoreItem xmlns:ds="http://schemas.openxmlformats.org/officeDocument/2006/customXml" ds:itemID="{3C3F21EB-4ACA-44E0-B2C7-170B62880900}">
-  <ds:schemaRefs>
-    <ds:schemaRef ds:uri="http://schemas.microsoft.com/VisualStudio/2011/storyboarding/control"/>
-  </ds:schemaRefs>
-</ds:datastoreItem>
-</file>
-
-<file path=customXml/itemProps11.xml><?xml version="1.0" encoding="utf-8"?>
-<ds:datastoreItem xmlns:ds="http://schemas.openxmlformats.org/officeDocument/2006/customXml" ds:itemID="{36807AD9-FA99-4396-B268-8F5D54ECCB5B}">
-  <ds:schemaRefs>
-    <ds:schemaRef ds:uri="http://schemas.microsoft.com/VisualStudio/2011/storyboarding/control"/>
-  </ds:schemaRefs>
-</ds:datastoreItem>
-</file>
-
-<file path=customXml/itemProps110.xml><?xml version="1.0" encoding="utf-8"?>
-<ds:datastoreItem xmlns:ds="http://schemas.openxmlformats.org/officeDocument/2006/customXml" ds:itemID="{05E9ACCB-10F4-4E4A-865B-263A490C6703}">
-  <ds:schemaRefs>
-    <ds:schemaRef ds:uri="http://schemas.microsoft.com/VisualStudio/2011/storyboarding/control"/>
-  </ds:schemaRefs>
-</ds:datastoreItem>
-</file>
-
-<file path=customXml/itemProps111.xml><?xml version="1.0" encoding="utf-8"?>
-<ds:datastoreItem xmlns:ds="http://schemas.openxmlformats.org/officeDocument/2006/customXml" ds:itemID="{069E0B3F-79AE-4FE8-9553-0BE9C5B697AA}">
-  <ds:schemaRefs>
-    <ds:schemaRef ds:uri="http://schemas.microsoft.com/VisualStudio/2011/storyboarding/control"/>
-  </ds:schemaRefs>
-</ds:datastoreItem>
-</file>
-
-<file path=customXml/itemProps112.xml><?xml version="1.0" encoding="utf-8"?>
-<ds:datastoreItem xmlns:ds="http://schemas.openxmlformats.org/officeDocument/2006/customXml" ds:itemID="{DF613E62-89E5-49BD-8B86-B43B79479696}">
-  <ds:schemaRefs>
-    <ds:schemaRef ds:uri="http://schemas.microsoft.com/VisualStudio/2011/storyboarding/control"/>
-  </ds:schemaRefs>
-</ds:datastoreItem>
-</file>
-
-<file path=customXml/itemProps113.xml><?xml version="1.0" encoding="utf-8"?>
-<ds:datastoreItem xmlns:ds="http://schemas.openxmlformats.org/officeDocument/2006/customXml" ds:itemID="{3A32850D-D4D4-4403-BB0A-828542FD4B3F}">
-  <ds:schemaRefs>
-    <ds:schemaRef ds:uri="http://schemas.microsoft.com/VisualStudio/2011/storyboarding/control"/>
-  </ds:schemaRefs>
-</ds:datastoreItem>
-</file>
-
-<file path=customXml/itemProps114.xml><?xml version="1.0" encoding="utf-8"?>
-<ds:datastoreItem xmlns:ds="http://schemas.openxmlformats.org/officeDocument/2006/customXml" ds:itemID="{7B74AC6A-97B8-4849-9340-303E1C1AE504}">
-  <ds:schemaRefs>
-    <ds:schemaRef ds:uri="http://schemas.microsoft.com/VisualStudio/2011/storyboarding/control"/>
-  </ds:schemaRefs>
-</ds:datastoreItem>
-</file>
-
-<file path=customXml/itemProps115.xml><?xml version="1.0" encoding="utf-8"?>
-<ds:datastoreItem xmlns:ds="http://schemas.openxmlformats.org/officeDocument/2006/customXml" ds:itemID="{231D95D8-1070-4440-83D5-6DCEFFBEDADF}">
-  <ds:schemaRefs>
-    <ds:schemaRef ds:uri="http://schemas.microsoft.com/VisualStudio/2011/storyboarding/control"/>
-  </ds:schemaRefs>
-</ds:datastoreItem>
-</file>
-
-<file path=customXml/itemProps116.xml><?xml version="1.0" encoding="utf-8"?>
-<ds:datastoreItem xmlns:ds="http://schemas.openxmlformats.org/officeDocument/2006/customXml" ds:itemID="{3E5C5B09-179B-4D6D-90E0-E1FC58C05C28}">
-  <ds:schemaRefs>
-    <ds:schemaRef ds:uri="http://schemas.microsoft.com/VisualStudio/2011/storyboarding/control"/>
-  </ds:schemaRefs>
-</ds:datastoreItem>
-</file>
-
-<file path=customXml/itemProps117.xml><?xml version="1.0" encoding="utf-8"?>
-<ds:datastoreItem xmlns:ds="http://schemas.openxmlformats.org/officeDocument/2006/customXml" ds:itemID="{B99204DE-0958-4829-B68E-38983042787A}">
-  <ds:schemaRefs>
-    <ds:schemaRef ds:uri="http://schemas.microsoft.com/VisualStudio/2011/storyboarding/control"/>
-  </ds:schemaRefs>
-</ds:datastoreItem>
-</file>
-
-<file path=customXml/itemProps118.xml><?xml version="1.0" encoding="utf-8"?>
-<ds:datastoreItem xmlns:ds="http://schemas.openxmlformats.org/officeDocument/2006/customXml" ds:itemID="{B43FC713-005D-4510-8107-1E84E6F16CA0}">
-  <ds:schemaRefs>
-    <ds:schemaRef ds:uri="http://schemas.microsoft.com/VisualStudio/2011/storyboarding/control"/>
-  </ds:schemaRefs>
-</ds:datastoreItem>
-</file>
-
-<file path=customXml/itemProps119.xml><?xml version="1.0" encoding="utf-8"?>
-<ds:datastoreItem xmlns:ds="http://schemas.openxmlformats.org/officeDocument/2006/customXml" ds:itemID="{B77AE31D-A2A4-42C1-95A4-5EC1BE73F53E}">
-  <ds:schemaRefs>
-    <ds:schemaRef ds:uri="http://schemas.microsoft.com/VisualStudio/2011/storyboarding/control"/>
-  </ds:schemaRefs>
-</ds:datastoreItem>
-</file>
-
-<file path=customXml/itemProps12.xml><?xml version="1.0" encoding="utf-8"?>
-<ds:datastoreItem xmlns:ds="http://schemas.openxmlformats.org/officeDocument/2006/customXml" ds:itemID="{4752AF7E-E96B-4F6F-838E-507C5D0047B0}">
-  <ds:schemaRefs>
-    <ds:schemaRef ds:uri="http://schemas.microsoft.com/VisualStudio/2011/storyboarding/control"/>
-  </ds:schemaRefs>
-</ds:datastoreItem>
-</file>
-
-<file path=customXml/itemProps120.xml><?xml version="1.0" encoding="utf-8"?>
-<ds:datastoreItem xmlns:ds="http://schemas.openxmlformats.org/officeDocument/2006/customXml" ds:itemID="{A71871C3-B400-4B1D-8E65-C6A035B92536}">
-  <ds:schemaRefs>
-    <ds:schemaRef ds:uri="http://schemas.microsoft.com/VisualStudio/2011/storyboarding/control"/>
-  </ds:schemaRefs>
-</ds:datastoreItem>
-</file>
-
-<file path=customXml/itemProps121.xml><?xml version="1.0" encoding="utf-8"?>
-<ds:datastoreItem xmlns:ds="http://schemas.openxmlformats.org/officeDocument/2006/customXml" ds:itemID="{B02E87D1-67B4-47D3-A093-1EB92BDCF821}">
-  <ds:schemaRefs>
-    <ds:schemaRef ds:uri="http://schemas.microsoft.com/VisualStudio/2011/storyboarding/control"/>
-  </ds:schemaRefs>
-</ds:datastoreItem>
-</file>
-
-<file path=customXml/itemProps122.xml><?xml version="1.0" encoding="utf-8"?>
-<ds:datastoreItem xmlns:ds="http://schemas.openxmlformats.org/officeDocument/2006/customXml" ds:itemID="{CF80AD5C-F7EF-4812-84A3-81E1D0889592}">
-  <ds:schemaRefs>
-    <ds:schemaRef ds:uri="http://schemas.microsoft.com/VisualStudio/2011/storyboarding/control"/>
-  </ds:schemaRefs>
-</ds:datastoreItem>
-</file>
-
-<file path=customXml/itemProps123.xml><?xml version="1.0" encoding="utf-8"?>
+<file path=customXml/itemProps21.xml><?xml version="1.0" encoding="utf-8"?>
 <ds:datastoreItem xmlns:ds="http://schemas.openxmlformats.org/officeDocument/2006/customXml" ds:itemID="{621A6B95-DD7C-4D2F-A02F-4F505FB3C2D8}">
   <ds:schemaRefs>
     <ds:schemaRef ds:uri="http://schemas.microsoft.com/VisualStudio/2011/storyboarding/control"/>
@@ -29905,39 +30051,7 @@
 </ds:datastoreItem>
 </file>
 
-<file path=customXml/itemProps124.xml><?xml version="1.0" encoding="utf-8"?>
-<ds:datastoreItem xmlns:ds="http://schemas.openxmlformats.org/officeDocument/2006/customXml" ds:itemID="{2B02A18B-59D7-4A33-80A0-9970E53FF9BD}">
-  <ds:schemaRefs>
-    <ds:schemaRef ds:uri="http://schemas.microsoft.com/VisualStudio/2011/storyboarding/control"/>
-  </ds:schemaRefs>
-</ds:datastoreItem>
-</file>
-
-<file path=customXml/itemProps125.xml><?xml version="1.0" encoding="utf-8"?>
-<ds:datastoreItem xmlns:ds="http://schemas.openxmlformats.org/officeDocument/2006/customXml" ds:itemID="{9113EAFC-E473-486D-9A05-18CDD81498C7}">
-  <ds:schemaRefs>
-    <ds:schemaRef ds:uri="http://schemas.microsoft.com/VisualStudio/2011/storyboarding/control"/>
-  </ds:schemaRefs>
-</ds:datastoreItem>
-</file>
-
-<file path=customXml/itemProps126.xml><?xml version="1.0" encoding="utf-8"?>
-<ds:datastoreItem xmlns:ds="http://schemas.openxmlformats.org/officeDocument/2006/customXml" ds:itemID="{09D364F4-B5CE-41CD-9C86-F866BBA6DDBC}">
-  <ds:schemaRefs>
-    <ds:schemaRef ds:uri="http://schemas.microsoft.com/VisualStudio/2011/storyboarding/control"/>
-  </ds:schemaRefs>
-</ds:datastoreItem>
-</file>
-
-<file path=customXml/itemProps127.xml><?xml version="1.0" encoding="utf-8"?>
-<ds:datastoreItem xmlns:ds="http://schemas.openxmlformats.org/officeDocument/2006/customXml" ds:itemID="{9A4F1E23-F475-4BF6-B241-87F9E6A5C227}">
-  <ds:schemaRefs>
-    <ds:schemaRef ds:uri="http://schemas.microsoft.com/VisualStudio/2011/storyboarding/control"/>
-  </ds:schemaRefs>
-</ds:datastoreItem>
-</file>
-
-<file path=customXml/itemProps128.xml><?xml version="1.0" encoding="utf-8"?>
+<file path=customXml/itemProps22.xml><?xml version="1.0" encoding="utf-8"?>
 <ds:datastoreItem xmlns:ds="http://schemas.openxmlformats.org/officeDocument/2006/customXml" ds:itemID="{130E0041-9187-401D-968A-5EE7BE79B7A7}">
   <ds:schemaRefs>
     <ds:schemaRef ds:uri="http://schemas.microsoft.com/VisualStudio/2011/storyboarding/control"/>
@@ -29945,120 +30059,8 @@
 </ds:datastoreItem>
 </file>
 
-<file path=customXml/itemProps129.xml><?xml version="1.0" encoding="utf-8"?>
-<ds:datastoreItem xmlns:ds="http://schemas.openxmlformats.org/officeDocument/2006/customXml" ds:itemID="{C4DED8DB-1570-4F47-9448-04ABC9B3FE90}">
-  <ds:schemaRefs>
-    <ds:schemaRef ds:uri="http://schemas.microsoft.com/VisualStudio/2011/storyboarding/control"/>
-  </ds:schemaRefs>
-</ds:datastoreItem>
-</file>
-
-<file path=customXml/itemProps13.xml><?xml version="1.0" encoding="utf-8"?>
-<ds:datastoreItem xmlns:ds="http://schemas.openxmlformats.org/officeDocument/2006/customXml" ds:itemID="{53F52C43-64C8-4696-B137-0CED1A8AD725}">
-  <ds:schemaRefs>
-    <ds:schemaRef ds:uri="http://schemas.microsoft.com/VisualStudio/2011/storyboarding/control"/>
-  </ds:schemaRefs>
-</ds:datastoreItem>
-</file>
-
-<file path=customXml/itemProps130.xml><?xml version="1.0" encoding="utf-8"?>
-<ds:datastoreItem xmlns:ds="http://schemas.openxmlformats.org/officeDocument/2006/customXml" ds:itemID="{D6FA17E7-48A0-4834-816F-F209CC087DA9}">
-  <ds:schemaRefs>
-    <ds:schemaRef ds:uri="http://schemas.microsoft.com/VisualStudio/2011/storyboarding/control"/>
-  </ds:schemaRefs>
-</ds:datastoreItem>
-</file>
-
-<file path=customXml/itemProps131.xml><?xml version="1.0" encoding="utf-8"?>
-<ds:datastoreItem xmlns:ds="http://schemas.openxmlformats.org/officeDocument/2006/customXml" ds:itemID="{CBD399AF-34BE-46B7-B03E-5D463F55DB14}">
-  <ds:schemaRefs>
-    <ds:schemaRef ds:uri="http://schemas.microsoft.com/VisualStudio/2011/storyboarding/control"/>
-  </ds:schemaRefs>
-</ds:datastoreItem>
-</file>
-
-<file path=customXml/itemProps14.xml><?xml version="1.0" encoding="utf-8"?>
-<ds:datastoreItem xmlns:ds="http://schemas.openxmlformats.org/officeDocument/2006/customXml" ds:itemID="{A5E10392-F138-4775-8CDF-2D37BE1C0731}">
-  <ds:schemaRefs>
-    <ds:schemaRef ds:uri="http://schemas.microsoft.com/VisualStudio/2011/storyboarding/control"/>
-  </ds:schemaRefs>
-</ds:datastoreItem>
-</file>
-
-<file path=customXml/itemProps15.xml><?xml version="1.0" encoding="utf-8"?>
-<ds:datastoreItem xmlns:ds="http://schemas.openxmlformats.org/officeDocument/2006/customXml" ds:itemID="{7B44F50E-25E8-4532-A170-2D8943792F1D}">
-  <ds:schemaRefs>
-    <ds:schemaRef ds:uri="http://schemas.microsoft.com/VisualStudio/2011/storyboarding/control"/>
-  </ds:schemaRefs>
-</ds:datastoreItem>
-</file>
-
-<file path=customXml/itemProps16.xml><?xml version="1.0" encoding="utf-8"?>
-<ds:datastoreItem xmlns:ds="http://schemas.openxmlformats.org/officeDocument/2006/customXml" ds:itemID="{6401E635-2C4B-4237-B325-6FE04D00F31A}">
-  <ds:schemaRefs>
-    <ds:schemaRef ds:uri="http://schemas.microsoft.com/VisualStudio/2011/storyboarding/control"/>
-  </ds:schemaRefs>
-</ds:datastoreItem>
-</file>
-
-<file path=customXml/itemProps17.xml><?xml version="1.0" encoding="utf-8"?>
-<ds:datastoreItem xmlns:ds="http://schemas.openxmlformats.org/officeDocument/2006/customXml" ds:itemID="{4A5DB802-63D2-4D80-A17A-F3BC1D2B2B90}">
-  <ds:schemaRefs>
-    <ds:schemaRef ds:uri="http://schemas.microsoft.com/VisualStudio/2011/storyboarding/control"/>
-  </ds:schemaRefs>
-</ds:datastoreItem>
-</file>
-
-<file path=customXml/itemProps18.xml><?xml version="1.0" encoding="utf-8"?>
-<ds:datastoreItem xmlns:ds="http://schemas.openxmlformats.org/officeDocument/2006/customXml" ds:itemID="{8772038A-AD14-4DA4-B313-139504F9C271}">
-  <ds:schemaRefs>
-    <ds:schemaRef ds:uri="http://schemas.microsoft.com/VisualStudio/2011/storyboarding/control"/>
-  </ds:schemaRefs>
-</ds:datastoreItem>
-</file>
-
-<file path=customXml/itemProps19.xml><?xml version="1.0" encoding="utf-8"?>
-<ds:datastoreItem xmlns:ds="http://schemas.openxmlformats.org/officeDocument/2006/customXml" ds:itemID="{BB707719-AEF7-45A2-ACBD-B694F20C9FEF}">
-  <ds:schemaRefs>
-    <ds:schemaRef ds:uri="http://schemas.microsoft.com/VisualStudio/2011/storyboarding/control"/>
-  </ds:schemaRefs>
-</ds:datastoreItem>
-</file>
-
-<file path=customXml/itemProps2.xml><?xml version="1.0" encoding="utf-8"?>
-<ds:datastoreItem xmlns:ds="http://schemas.openxmlformats.org/officeDocument/2006/customXml" ds:itemID="{D03F7A5D-C76B-4088-9A4C-531AC82D4C8A}">
-  <ds:schemaRefs>
-    <ds:schemaRef ds:uri="http://schemas.microsoft.com/VisualStudio/2011/storyboarding/control"/>
-  </ds:schemaRefs>
-</ds:datastoreItem>
-</file>
-
-<file path=customXml/itemProps20.xml><?xml version="1.0" encoding="utf-8"?>
-<ds:datastoreItem xmlns:ds="http://schemas.openxmlformats.org/officeDocument/2006/customXml" ds:itemID="{BB56C3EA-80E4-43EB-967E-FC1F4075AE8F}">
-  <ds:schemaRefs>
-    <ds:schemaRef ds:uri="http://schemas.microsoft.com/VisualStudio/2011/storyboarding/control"/>
-  </ds:schemaRefs>
-</ds:datastoreItem>
-</file>
-
-<file path=customXml/itemProps21.xml><?xml version="1.0" encoding="utf-8"?>
-<ds:datastoreItem xmlns:ds="http://schemas.openxmlformats.org/officeDocument/2006/customXml" ds:itemID="{0F22CFB0-2864-42AC-9AD6-EE14E3D0BB10}">
-  <ds:schemaRefs>
-    <ds:schemaRef ds:uri="http://schemas.microsoft.com/VisualStudio/2011/storyboarding/control"/>
-  </ds:schemaRefs>
-</ds:datastoreItem>
-</file>
-
-<file path=customXml/itemProps22.xml><?xml version="1.0" encoding="utf-8"?>
-<ds:datastoreItem xmlns:ds="http://schemas.openxmlformats.org/officeDocument/2006/customXml" ds:itemID="{5B6A9ECE-F330-4F9C-9CA8-4ED6E370EB68}">
-  <ds:schemaRefs>
-    <ds:schemaRef ds:uri="http://schemas.microsoft.com/VisualStudio/2011/storyboarding/control"/>
-  </ds:schemaRefs>
-</ds:datastoreItem>
-</file>
-
 <file path=customXml/itemProps23.xml><?xml version="1.0" encoding="utf-8"?>
-<ds:datastoreItem xmlns:ds="http://schemas.openxmlformats.org/officeDocument/2006/customXml" ds:itemID="{8E0229EF-F708-4A70-A601-D6FD7AF77191}">
+<ds:datastoreItem xmlns:ds="http://schemas.openxmlformats.org/officeDocument/2006/customXml" ds:itemID="{E7135E8E-149E-43E8-8716-7AFFA79ABB83}">
   <ds:schemaRefs>
     <ds:schemaRef ds:uri="http://schemas.microsoft.com/VisualStudio/2011/storyboarding/control"/>
   </ds:schemaRefs>
@@ -30066,7 +30068,7 @@
 </file>
 
 <file path=customXml/itemProps24.xml><?xml version="1.0" encoding="utf-8"?>
-<ds:datastoreItem xmlns:ds="http://schemas.openxmlformats.org/officeDocument/2006/customXml" ds:itemID="{E9529ED8-ECF1-4169-A657-873F7E2D79D4}">
+<ds:datastoreItem xmlns:ds="http://schemas.openxmlformats.org/officeDocument/2006/customXml" ds:itemID="{41142646-6685-458D-A152-4DDC9DEBBB50}">
   <ds:schemaRefs>
     <ds:schemaRef ds:uri="http://schemas.microsoft.com/VisualStudio/2011/storyboarding/control"/>
   </ds:schemaRefs>
@@ -30074,7 +30076,7 @@
 </file>
 
 <file path=customXml/itemProps25.xml><?xml version="1.0" encoding="utf-8"?>
-<ds:datastoreItem xmlns:ds="http://schemas.openxmlformats.org/officeDocument/2006/customXml" ds:itemID="{EDD43B89-23A8-4BAF-B32C-3EC659838CD5}">
+<ds:datastoreItem xmlns:ds="http://schemas.openxmlformats.org/officeDocument/2006/customXml" ds:itemID="{28E5680E-08E7-4468-A693-3805C176B9A4}">
   <ds:schemaRefs>
     <ds:schemaRef ds:uri="http://schemas.microsoft.com/VisualStudio/2011/storyboarding/control"/>
   </ds:schemaRefs>
@@ -30082,7 +30084,7 @@
 </file>
 
 <file path=customXml/itemProps26.xml><?xml version="1.0" encoding="utf-8"?>
-<ds:datastoreItem xmlns:ds="http://schemas.openxmlformats.org/officeDocument/2006/customXml" ds:itemID="{9B42172C-79E0-4D31-98DB-D4B2B95D22D1}">
+<ds:datastoreItem xmlns:ds="http://schemas.openxmlformats.org/officeDocument/2006/customXml" ds:itemID="{5B6A9ECE-F330-4F9C-9CA8-4ED6E370EB68}">
   <ds:schemaRefs>
     <ds:schemaRef ds:uri="http://schemas.microsoft.com/VisualStudio/2011/storyboarding/control"/>
   </ds:schemaRefs>
@@ -30098,6 +30100,326 @@
 </file>
 
 <file path=customXml/itemProps28.xml><?xml version="1.0" encoding="utf-8"?>
+<ds:datastoreItem xmlns:ds="http://schemas.openxmlformats.org/officeDocument/2006/customXml" ds:itemID="{FCF4D0A2-3E24-4C37-A80A-0F241AF9BBA2}">
+  <ds:schemaRefs>
+    <ds:schemaRef ds:uri="http://schemas.microsoft.com/VisualStudio/2011/storyboarding/control"/>
+  </ds:schemaRefs>
+</ds:datastoreItem>
+</file>
+
+<file path=customXml/itemProps29.xml><?xml version="1.0" encoding="utf-8"?>
+<ds:datastoreItem xmlns:ds="http://schemas.openxmlformats.org/officeDocument/2006/customXml" ds:itemID="{AC5BBA2E-2296-47A0-956B-285D5036D2E5}">
+  <ds:schemaRefs>
+    <ds:schemaRef ds:uri="http://schemas.microsoft.com/VisualStudio/2011/storyboarding/control"/>
+  </ds:schemaRefs>
+</ds:datastoreItem>
+</file>
+
+<file path=customXml/itemProps3.xml><?xml version="1.0" encoding="utf-8"?>
+<ds:datastoreItem xmlns:ds="http://schemas.openxmlformats.org/officeDocument/2006/customXml" ds:itemID="{0F22CFB0-2864-42AC-9AD6-EE14E3D0BB10}">
+  <ds:schemaRefs>
+    <ds:schemaRef ds:uri="http://schemas.microsoft.com/VisualStudio/2011/storyboarding/control"/>
+  </ds:schemaRefs>
+</ds:datastoreItem>
+</file>
+
+<file path=customXml/itemProps30.xml><?xml version="1.0" encoding="utf-8"?>
+<ds:datastoreItem xmlns:ds="http://schemas.openxmlformats.org/officeDocument/2006/customXml" ds:itemID="{5BBCFD82-ED2F-487D-A675-50CF1EF58F4F}">
+  <ds:schemaRefs>
+    <ds:schemaRef ds:uri="http://schemas.microsoft.com/VisualStudio/2011/storyboarding/control"/>
+  </ds:schemaRefs>
+</ds:datastoreItem>
+</file>
+
+<file path=customXml/itemProps31.xml><?xml version="1.0" encoding="utf-8"?>
+<ds:datastoreItem xmlns:ds="http://schemas.openxmlformats.org/officeDocument/2006/customXml" ds:itemID="{AD363D84-0831-44A2-BF7B-30A738B91E75}">
+  <ds:schemaRefs>
+    <ds:schemaRef ds:uri="http://schemas.microsoft.com/VisualStudio/2011/storyboarding/control"/>
+  </ds:schemaRefs>
+</ds:datastoreItem>
+</file>
+
+<file path=customXml/itemProps32.xml><?xml version="1.0" encoding="utf-8"?>
+<ds:datastoreItem xmlns:ds="http://schemas.openxmlformats.org/officeDocument/2006/customXml" ds:itemID="{3A32850D-D4D4-4403-BB0A-828542FD4B3F}">
+  <ds:schemaRefs>
+    <ds:schemaRef ds:uri="http://schemas.microsoft.com/VisualStudio/2011/storyboarding/control"/>
+  </ds:schemaRefs>
+</ds:datastoreItem>
+</file>
+
+<file path=customXml/itemProps33.xml><?xml version="1.0" encoding="utf-8"?>
+<ds:datastoreItem xmlns:ds="http://schemas.openxmlformats.org/officeDocument/2006/customXml" ds:itemID="{B43FC713-005D-4510-8107-1E84E6F16CA0}">
+  <ds:schemaRefs>
+    <ds:schemaRef ds:uri="http://schemas.microsoft.com/VisualStudio/2011/storyboarding/control"/>
+  </ds:schemaRefs>
+</ds:datastoreItem>
+</file>
+
+<file path=customXml/itemProps34.xml><?xml version="1.0" encoding="utf-8"?>
+<ds:datastoreItem xmlns:ds="http://schemas.openxmlformats.org/officeDocument/2006/customXml" ds:itemID="{A398BD60-31E4-432C-8143-E50754CAC136}">
+  <ds:schemaRefs>
+    <ds:schemaRef ds:uri="http://schemas.microsoft.com/VisualStudio/2011/storyboarding/control"/>
+  </ds:schemaRefs>
+</ds:datastoreItem>
+</file>
+
+<file path=customXml/itemProps35.xml><?xml version="1.0" encoding="utf-8"?>
+<ds:datastoreItem xmlns:ds="http://schemas.openxmlformats.org/officeDocument/2006/customXml" ds:itemID="{57462945-5402-4C79-9227-BDFE1CA893F7}">
+  <ds:schemaRefs>
+    <ds:schemaRef ds:uri="http://schemas.microsoft.com/VisualStudio/2011/storyboarding/control"/>
+  </ds:schemaRefs>
+</ds:datastoreItem>
+</file>
+
+<file path=customXml/itemProps36.xml><?xml version="1.0" encoding="utf-8"?>
+<ds:datastoreItem xmlns:ds="http://schemas.openxmlformats.org/officeDocument/2006/customXml" ds:itemID="{4752AF7E-E96B-4F6F-838E-507C5D0047B0}">
+  <ds:schemaRefs>
+    <ds:schemaRef ds:uri="http://schemas.microsoft.com/VisualStudio/2011/storyboarding/control"/>
+  </ds:schemaRefs>
+</ds:datastoreItem>
+</file>
+
+<file path=customXml/itemProps37.xml><?xml version="1.0" encoding="utf-8"?>
+<ds:datastoreItem xmlns:ds="http://schemas.openxmlformats.org/officeDocument/2006/customXml" ds:itemID="{4A5DB802-63D2-4D80-A17A-F3BC1D2B2B90}">
+  <ds:schemaRefs>
+    <ds:schemaRef ds:uri="http://schemas.microsoft.com/VisualStudio/2011/storyboarding/control"/>
+  </ds:schemaRefs>
+</ds:datastoreItem>
+</file>
+
+<file path=customXml/itemProps38.xml><?xml version="1.0" encoding="utf-8"?>
+<ds:datastoreItem xmlns:ds="http://schemas.openxmlformats.org/officeDocument/2006/customXml" ds:itemID="{EDD43B89-23A8-4BAF-B32C-3EC659838CD5}">
+  <ds:schemaRefs>
+    <ds:schemaRef ds:uri="http://schemas.microsoft.com/VisualStudio/2011/storyboarding/control"/>
+  </ds:schemaRefs>
+</ds:datastoreItem>
+</file>
+
+<file path=customXml/itemProps39.xml><?xml version="1.0" encoding="utf-8"?>
+<ds:datastoreItem xmlns:ds="http://schemas.openxmlformats.org/officeDocument/2006/customXml" ds:itemID="{63429355-A306-4F89-9095-3937594F42DA}">
+  <ds:schemaRefs>
+    <ds:schemaRef ds:uri="http://schemas.microsoft.com/VisualStudio/2011/storyboarding/control"/>
+  </ds:schemaRefs>
+</ds:datastoreItem>
+</file>
+
+<file path=customXml/itemProps4.xml><?xml version="1.0" encoding="utf-8"?>
+<ds:datastoreItem xmlns:ds="http://schemas.openxmlformats.org/officeDocument/2006/customXml" ds:itemID="{B0127684-3D7A-4EC8-B1E6-CDB692FD7888}">
+  <ds:schemaRefs>
+    <ds:schemaRef ds:uri="http://schemas.microsoft.com/VisualStudio/2011/storyboarding/control"/>
+  </ds:schemaRefs>
+</ds:datastoreItem>
+</file>
+
+<file path=customXml/itemProps40.xml><?xml version="1.0" encoding="utf-8"?>
+<ds:datastoreItem xmlns:ds="http://schemas.openxmlformats.org/officeDocument/2006/customXml" ds:itemID="{2B3F5897-5870-47A7-89F5-542B80939A28}">
+  <ds:schemaRefs>
+    <ds:schemaRef ds:uri="http://schemas.microsoft.com/VisualStudio/2011/storyboarding/control"/>
+  </ds:schemaRefs>
+</ds:datastoreItem>
+</file>
+
+<file path=customXml/itemProps41.xml><?xml version="1.0" encoding="utf-8"?>
+<ds:datastoreItem xmlns:ds="http://schemas.openxmlformats.org/officeDocument/2006/customXml" ds:itemID="{58AABF35-1F4B-47DB-8ED0-17C853FAF05E}">
+  <ds:schemaRefs>
+    <ds:schemaRef ds:uri="http://schemas.microsoft.com/VisualStudio/2011/storyboarding/control"/>
+  </ds:schemaRefs>
+</ds:datastoreItem>
+</file>
+
+<file path=customXml/itemProps42.xml><?xml version="1.0" encoding="utf-8"?>
+<ds:datastoreItem xmlns:ds="http://schemas.openxmlformats.org/officeDocument/2006/customXml" ds:itemID="{F426595F-EDB2-4AE5-AFB4-FA54B9A9951B}">
+  <ds:schemaRefs>
+    <ds:schemaRef ds:uri="http://schemas.microsoft.com/VisualStudio/2011/storyboarding/control"/>
+  </ds:schemaRefs>
+</ds:datastoreItem>
+</file>
+
+<file path=customXml/itemProps43.xml><?xml version="1.0" encoding="utf-8"?>
+<ds:datastoreItem xmlns:ds="http://schemas.openxmlformats.org/officeDocument/2006/customXml" ds:itemID="{C334EAFC-0B9F-4FD5-B23C-E7B7F8D50EB7}">
+  <ds:schemaRefs>
+    <ds:schemaRef ds:uri="http://schemas.microsoft.com/VisualStudio/2011/storyboarding/control"/>
+  </ds:schemaRefs>
+</ds:datastoreItem>
+</file>
+
+<file path=customXml/itemProps44.xml><?xml version="1.0" encoding="utf-8"?>
+<ds:datastoreItem xmlns:ds="http://schemas.openxmlformats.org/officeDocument/2006/customXml" ds:itemID="{B86FC14E-608D-4408-A64C-21E6AEE90D98}">
+  <ds:schemaRefs>
+    <ds:schemaRef ds:uri="http://schemas.microsoft.com/VisualStudio/2011/storyboarding/control"/>
+  </ds:schemaRefs>
+</ds:datastoreItem>
+</file>
+
+<file path=customXml/itemProps45.xml><?xml version="1.0" encoding="utf-8"?>
+<ds:datastoreItem xmlns:ds="http://schemas.openxmlformats.org/officeDocument/2006/customXml" ds:itemID="{AC2373A1-1AB1-4602-8A6A-0480E21041EF}">
+  <ds:schemaRefs>
+    <ds:schemaRef ds:uri="http://schemas.microsoft.com/VisualStudio/2011/storyboarding/control"/>
+  </ds:schemaRefs>
+</ds:datastoreItem>
+</file>
+
+<file path=customXml/itemProps46.xml><?xml version="1.0" encoding="utf-8"?>
+<ds:datastoreItem xmlns:ds="http://schemas.openxmlformats.org/officeDocument/2006/customXml" ds:itemID="{3E5C5B09-179B-4D6D-90E0-E1FC58C05C28}">
+  <ds:schemaRefs>
+    <ds:schemaRef ds:uri="http://schemas.microsoft.com/VisualStudio/2011/storyboarding/control"/>
+  </ds:schemaRefs>
+</ds:datastoreItem>
+</file>
+
+<file path=customXml/itemProps47.xml><?xml version="1.0" encoding="utf-8"?>
+<ds:datastoreItem xmlns:ds="http://schemas.openxmlformats.org/officeDocument/2006/customXml" ds:itemID="{2B02A18B-59D7-4A33-80A0-9970E53FF9BD}">
+  <ds:schemaRefs>
+    <ds:schemaRef ds:uri="http://schemas.microsoft.com/VisualStudio/2011/storyboarding/control"/>
+  </ds:schemaRefs>
+</ds:datastoreItem>
+</file>
+
+<file path=customXml/itemProps48.xml><?xml version="1.0" encoding="utf-8"?>
+<ds:datastoreItem xmlns:ds="http://schemas.openxmlformats.org/officeDocument/2006/customXml" ds:itemID="{C4DED8DB-1570-4F47-9448-04ABC9B3FE90}">
+  <ds:schemaRefs>
+    <ds:schemaRef ds:uri="http://schemas.microsoft.com/VisualStudio/2011/storyboarding/control"/>
+  </ds:schemaRefs>
+</ds:datastoreItem>
+</file>
+
+<file path=customXml/itemProps49.xml><?xml version="1.0" encoding="utf-8"?>
+<ds:datastoreItem xmlns:ds="http://schemas.openxmlformats.org/officeDocument/2006/customXml" ds:itemID="{BB56C3EA-80E4-43EB-967E-FC1F4075AE8F}">
+  <ds:schemaRefs>
+    <ds:schemaRef ds:uri="http://schemas.microsoft.com/VisualStudio/2011/storyboarding/control"/>
+  </ds:schemaRefs>
+</ds:datastoreItem>
+</file>
+
+<file path=customXml/itemProps5.xml><?xml version="1.0" encoding="utf-8"?>
+<ds:datastoreItem xmlns:ds="http://schemas.openxmlformats.org/officeDocument/2006/customXml" ds:itemID="{064331DB-7518-410D-A0D8-5284293AA1EB}">
+  <ds:schemaRefs>
+    <ds:schemaRef ds:uri="http://schemas.microsoft.com/VisualStudio/2011/storyboarding/control"/>
+  </ds:schemaRefs>
+</ds:datastoreItem>
+</file>
+
+<file path=customXml/itemProps50.xml><?xml version="1.0" encoding="utf-8"?>
+<ds:datastoreItem xmlns:ds="http://schemas.openxmlformats.org/officeDocument/2006/customXml" ds:itemID="{26263F03-B0D6-46AA-A32D-9CF54A1A081E}">
+  <ds:schemaRefs>
+    <ds:schemaRef ds:uri="http://schemas.microsoft.com/VisualStudio/2011/storyboarding/control"/>
+  </ds:schemaRefs>
+</ds:datastoreItem>
+</file>
+
+<file path=customXml/itemProps51.xml><?xml version="1.0" encoding="utf-8"?>
+<ds:datastoreItem xmlns:ds="http://schemas.openxmlformats.org/officeDocument/2006/customXml" ds:itemID="{C441ACAD-CE6B-4149-AD4A-61A9122E941E}">
+  <ds:schemaRefs>
+    <ds:schemaRef ds:uri="http://schemas.microsoft.com/VisualStudio/2011/storyboarding/control"/>
+  </ds:schemaRefs>
+</ds:datastoreItem>
+</file>
+
+<file path=customXml/itemProps52.xml><?xml version="1.0" encoding="utf-8"?>
+<ds:datastoreItem xmlns:ds="http://schemas.openxmlformats.org/officeDocument/2006/customXml" ds:itemID="{99B99914-C8A3-4286-92E4-E8A830CA30B8}">
+  <ds:schemaRefs>
+    <ds:schemaRef ds:uri="http://schemas.microsoft.com/VisualStudio/2011/storyboarding/control"/>
+  </ds:schemaRefs>
+</ds:datastoreItem>
+</file>
+
+<file path=customXml/itemProps53.xml><?xml version="1.0" encoding="utf-8"?>
+<ds:datastoreItem xmlns:ds="http://schemas.openxmlformats.org/officeDocument/2006/customXml" ds:itemID="{0DBC94CC-B6B0-40F4-8803-60962B1DA9F5}">
+  <ds:schemaRefs>
+    <ds:schemaRef ds:uri="http://schemas.microsoft.com/VisualStudio/2011/storyboarding/control"/>
+  </ds:schemaRefs>
+</ds:datastoreItem>
+</file>
+
+<file path=customXml/itemProps54.xml><?xml version="1.0" encoding="utf-8"?>
+<ds:datastoreItem xmlns:ds="http://schemas.openxmlformats.org/officeDocument/2006/customXml" ds:itemID="{EC127A49-F407-471A-A80E-5F5EE70EDA4B}">
+  <ds:schemaRefs>
+    <ds:schemaRef ds:uri="http://schemas.microsoft.com/VisualStudio/2011/storyboarding/control"/>
+  </ds:schemaRefs>
+</ds:datastoreItem>
+</file>
+
+<file path=customXml/itemProps55.xml><?xml version="1.0" encoding="utf-8"?>
+<ds:datastoreItem xmlns:ds="http://schemas.openxmlformats.org/officeDocument/2006/customXml" ds:itemID="{E0057B20-6B97-47AF-A243-7E46836062E5}">
+  <ds:schemaRefs>
+    <ds:schemaRef ds:uri="http://schemas.microsoft.com/VisualStudio/2011/storyboarding/control"/>
+  </ds:schemaRefs>
+</ds:datastoreItem>
+</file>
+
+<file path=customXml/itemProps56.xml><?xml version="1.0" encoding="utf-8"?>
+<ds:datastoreItem xmlns:ds="http://schemas.openxmlformats.org/officeDocument/2006/customXml" ds:itemID="{7D58A88F-75F8-4AE3-8BDF-30484A042543}">
+  <ds:schemaRefs>
+    <ds:schemaRef ds:uri="http://schemas.microsoft.com/VisualStudio/2011/storyboarding/control"/>
+  </ds:schemaRefs>
+</ds:datastoreItem>
+</file>
+
+<file path=customXml/itemProps57.xml><?xml version="1.0" encoding="utf-8"?>
+<ds:datastoreItem xmlns:ds="http://schemas.openxmlformats.org/officeDocument/2006/customXml" ds:itemID="{9DE28D0E-DE7B-441F-B413-1337D6D6F6C7}">
+  <ds:schemaRefs>
+    <ds:schemaRef ds:uri="http://schemas.microsoft.com/VisualStudio/2011/storyboarding/control"/>
+  </ds:schemaRefs>
+</ds:datastoreItem>
+</file>
+
+<file path=customXml/itemProps58.xml><?xml version="1.0" encoding="utf-8"?>
+<ds:datastoreItem xmlns:ds="http://schemas.openxmlformats.org/officeDocument/2006/customXml" ds:itemID="{6940F956-B60B-4364-AEC7-DD62F6E086AE}">
+  <ds:schemaRefs>
+    <ds:schemaRef ds:uri="http://schemas.microsoft.com/VisualStudio/2011/storyboarding/control"/>
+  </ds:schemaRefs>
+</ds:datastoreItem>
+</file>
+
+<file path=customXml/itemProps59.xml><?xml version="1.0" encoding="utf-8"?>
+<ds:datastoreItem xmlns:ds="http://schemas.openxmlformats.org/officeDocument/2006/customXml" ds:itemID="{069E0B3F-79AE-4FE8-9553-0BE9C5B697AA}">
+  <ds:schemaRefs>
+    <ds:schemaRef ds:uri="http://schemas.microsoft.com/VisualStudio/2011/storyboarding/control"/>
+  </ds:schemaRefs>
+</ds:datastoreItem>
+</file>
+
+<file path=customXml/itemProps6.xml><?xml version="1.0" encoding="utf-8"?>
+<ds:datastoreItem xmlns:ds="http://schemas.openxmlformats.org/officeDocument/2006/customXml" ds:itemID="{A009DD09-0E91-41FA-93DB-ADE76D45C2E8}">
+  <ds:schemaRefs>
+    <ds:schemaRef ds:uri="http://schemas.microsoft.com/VisualStudio/2011/storyboarding/control"/>
+  </ds:schemaRefs>
+</ds:datastoreItem>
+</file>
+
+<file path=customXml/itemProps60.xml><?xml version="1.0" encoding="utf-8"?>
+<ds:datastoreItem xmlns:ds="http://schemas.openxmlformats.org/officeDocument/2006/customXml" ds:itemID="{1C290400-708A-4F32-B6CE-889254E6BB2E}">
+  <ds:schemaRefs>
+    <ds:schemaRef ds:uri="http://schemas.microsoft.com/VisualStudio/2011/storyboarding/control"/>
+  </ds:schemaRefs>
+</ds:datastoreItem>
+</file>
+
+<file path=customXml/itemProps61.xml><?xml version="1.0" encoding="utf-8"?>
+<ds:datastoreItem xmlns:ds="http://schemas.openxmlformats.org/officeDocument/2006/customXml" ds:itemID="{4AA07A6C-68DB-4E6F-8087-E327C2426BD0}">
+  <ds:schemaRefs>
+    <ds:schemaRef ds:uri="http://schemas.microsoft.com/VisualStudio/2011/storyboarding/control"/>
+  </ds:schemaRefs>
+</ds:datastoreItem>
+</file>
+
+<file path=customXml/itemProps62.xml><?xml version="1.0" encoding="utf-8"?>
+<ds:datastoreItem xmlns:ds="http://schemas.openxmlformats.org/officeDocument/2006/customXml" ds:itemID="{7B44F50E-25E8-4532-A170-2D8943792F1D}">
+  <ds:schemaRefs>
+    <ds:schemaRef ds:uri="http://schemas.microsoft.com/VisualStudio/2011/storyboarding/control"/>
+  </ds:schemaRefs>
+</ds:datastoreItem>
+</file>
+
+<file path=customXml/itemProps63.xml><?xml version="1.0" encoding="utf-8"?>
+<ds:datastoreItem xmlns:ds="http://schemas.openxmlformats.org/officeDocument/2006/customXml" ds:itemID="{8E0229EF-F708-4A70-A601-D6FD7AF77191}">
+  <ds:schemaRefs>
+    <ds:schemaRef ds:uri="http://schemas.microsoft.com/VisualStudio/2011/storyboarding/control"/>
+  </ds:schemaRefs>
+</ds:datastoreItem>
+</file>
+
+<file path=customXml/itemProps64.xml><?xml version="1.0" encoding="utf-8"?>
 <ds:datastoreItem xmlns:ds="http://schemas.openxmlformats.org/officeDocument/2006/customXml" ds:itemID="{BBB33E0E-B159-46F1-A66D-AB4E0AAD2E2B}">
   <ds:schemaRefs>
     <ds:schemaRef ds:uri="http://schemas.microsoft.com/VisualStudio/2011/storyboarding/control"/>
@@ -30105,31 +30427,79 @@
 </ds:datastoreItem>
 </file>
 
-<file path=customXml/itemProps29.xml><?xml version="1.0" encoding="utf-8"?>
-<ds:datastoreItem xmlns:ds="http://schemas.openxmlformats.org/officeDocument/2006/customXml" ds:itemID="{311A9357-256A-41F4-AE75-7C855A39E077}">
+<file path=customXml/itemProps65.xml><?xml version="1.0" encoding="utf-8"?>
+<ds:datastoreItem xmlns:ds="http://schemas.openxmlformats.org/officeDocument/2006/customXml" ds:itemID="{98E88D4C-C1AD-4D64-BE80-CF2FAA54AC0B}">
   <ds:schemaRefs>
     <ds:schemaRef ds:uri="http://schemas.microsoft.com/VisualStudio/2011/storyboarding/control"/>
   </ds:schemaRefs>
 </ds:datastoreItem>
 </file>
 
-<file path=customXml/itemProps3.xml><?xml version="1.0" encoding="utf-8"?>
-<ds:datastoreItem xmlns:ds="http://schemas.openxmlformats.org/officeDocument/2006/customXml" ds:itemID="{9E31CF2A-CD40-4CEA-A83E-FBDEFEE09783}">
+<file path=customXml/itemProps66.xml><?xml version="1.0" encoding="utf-8"?>
+<ds:datastoreItem xmlns:ds="http://schemas.openxmlformats.org/officeDocument/2006/customXml" ds:itemID="{3AD8B322-C12D-4EDB-83F5-2D2FDB6AE033}">
   <ds:schemaRefs>
     <ds:schemaRef ds:uri="http://schemas.microsoft.com/VisualStudio/2011/storyboarding/control"/>
   </ds:schemaRefs>
 </ds:datastoreItem>
 </file>
 
-<file path=customXml/itemProps30.xml><?xml version="1.0" encoding="utf-8"?>
-<ds:datastoreItem xmlns:ds="http://schemas.openxmlformats.org/officeDocument/2006/customXml" ds:itemID="{AC69AB27-8DA4-4794-89F6-0222024A38B1}">
+<file path=customXml/itemProps67.xml><?xml version="1.0" encoding="utf-8"?>
+<ds:datastoreItem xmlns:ds="http://schemas.openxmlformats.org/officeDocument/2006/customXml" ds:itemID="{1D899A92-8E9D-42C5-98A8-34D89777E9F4}">
   <ds:schemaRefs>
     <ds:schemaRef ds:uri="http://schemas.microsoft.com/VisualStudio/2011/storyboarding/control"/>
   </ds:schemaRefs>
 </ds:datastoreItem>
 </file>
 
-<file path=customXml/itemProps31.xml><?xml version="1.0" encoding="utf-8"?>
+<file path=customXml/itemProps68.xml><?xml version="1.0" encoding="utf-8"?>
+<ds:datastoreItem xmlns:ds="http://schemas.openxmlformats.org/officeDocument/2006/customXml" ds:itemID="{10945163-6C7B-4EA4-A07E-42768A2D254A}">
+  <ds:schemaRefs>
+    <ds:schemaRef ds:uri="http://schemas.microsoft.com/VisualStudio/2011/storyboarding/control"/>
+  </ds:schemaRefs>
+</ds:datastoreItem>
+</file>
+
+<file path=customXml/itemProps69.xml><?xml version="1.0" encoding="utf-8"?>
+<ds:datastoreItem xmlns:ds="http://schemas.openxmlformats.org/officeDocument/2006/customXml" ds:itemID="{7B74AC6A-97B8-4849-9340-303E1C1AE504}">
+  <ds:schemaRefs>
+    <ds:schemaRef ds:uri="http://schemas.microsoft.com/VisualStudio/2011/storyboarding/control"/>
+  </ds:schemaRefs>
+</ds:datastoreItem>
+</file>
+
+<file path=customXml/itemProps7.xml><?xml version="1.0" encoding="utf-8"?>
+<ds:datastoreItem xmlns:ds="http://schemas.openxmlformats.org/officeDocument/2006/customXml" ds:itemID="{366A075B-F0BE-4489-9A0D-4A0749BE6031}">
+  <ds:schemaRefs>
+    <ds:schemaRef ds:uri="http://schemas.microsoft.com/VisualStudio/2011/storyboarding/control"/>
+  </ds:schemaRefs>
+</ds:datastoreItem>
+</file>
+
+<file path=customXml/itemProps70.xml><?xml version="1.0" encoding="utf-8"?>
+<ds:datastoreItem xmlns:ds="http://schemas.openxmlformats.org/officeDocument/2006/customXml" ds:itemID="{B77AE31D-A2A4-42C1-95A4-5EC1BE73F53E}">
+  <ds:schemaRefs>
+    <ds:schemaRef ds:uri="http://schemas.microsoft.com/VisualStudio/2011/storyboarding/control"/>
+  </ds:schemaRefs>
+</ds:datastoreItem>
+</file>
+
+<file path=customXml/itemProps71.xml><?xml version="1.0" encoding="utf-8"?>
+<ds:datastoreItem xmlns:ds="http://schemas.openxmlformats.org/officeDocument/2006/customXml" ds:itemID="{9A4F1E23-F475-4BF6-B241-87F9E6A5C227}">
+  <ds:schemaRefs>
+    <ds:schemaRef ds:uri="http://schemas.microsoft.com/VisualStudio/2011/storyboarding/control"/>
+  </ds:schemaRefs>
+</ds:datastoreItem>
+</file>
+
+<file path=customXml/itemProps72.xml><?xml version="1.0" encoding="utf-8"?>
+<ds:datastoreItem xmlns:ds="http://schemas.openxmlformats.org/officeDocument/2006/customXml" ds:itemID="{EBE58D0C-2830-4249-A8DE-740FAE27E447}">
+  <ds:schemaRefs>
+    <ds:schemaRef ds:uri="http://schemas.microsoft.com/VisualStudio/2011/storyboarding/control"/>
+  </ds:schemaRefs>
+</ds:datastoreItem>
+</file>
+
+<file path=customXml/itemProps73.xml><?xml version="1.0" encoding="utf-8"?>
 <ds:datastoreItem xmlns:ds="http://schemas.openxmlformats.org/officeDocument/2006/customXml" ds:itemID="{938C4FE6-478D-42B6-A193-5046E734E956}">
   <ds:schemaRefs>
     <ds:schemaRef ds:uri="http://schemas.microsoft.com/VisualStudio/2011/storyboarding/control"/>
@@ -30137,23 +30507,175 @@
 </ds:datastoreItem>
 </file>
 
-<file path=customXml/itemProps32.xml><?xml version="1.0" encoding="utf-8"?>
-<ds:datastoreItem xmlns:ds="http://schemas.openxmlformats.org/officeDocument/2006/customXml" ds:itemID="{4BCD54F3-7312-4574-A273-3F51F0A67564}">
+<file path=customXml/itemProps74.xml><?xml version="1.0" encoding="utf-8"?>
+<ds:datastoreItem xmlns:ds="http://schemas.openxmlformats.org/officeDocument/2006/customXml" ds:itemID="{B9E39582-20FB-40E5-8D7B-3893BFE80B2F}">
   <ds:schemaRefs>
     <ds:schemaRef ds:uri="http://schemas.microsoft.com/VisualStudio/2011/storyboarding/control"/>
   </ds:schemaRefs>
 </ds:datastoreItem>
 </file>
 
-<file path=customXml/itemProps33.xml><?xml version="1.0" encoding="utf-8"?>
-<ds:datastoreItem xmlns:ds="http://schemas.openxmlformats.org/officeDocument/2006/customXml" ds:itemID="{63429355-A306-4F89-9095-3937594F42DA}">
+<file path=customXml/itemProps75.xml><?xml version="1.0" encoding="utf-8"?>
+<ds:datastoreItem xmlns:ds="http://schemas.openxmlformats.org/officeDocument/2006/customXml" ds:itemID="{71AD4EB6-36EB-418F-9293-1470C3743CBA}">
   <ds:schemaRefs>
     <ds:schemaRef ds:uri="http://schemas.microsoft.com/VisualStudio/2011/storyboarding/control"/>
   </ds:schemaRefs>
 </ds:datastoreItem>
 </file>
 
-<file path=customXml/itemProps34.xml><?xml version="1.0" encoding="utf-8"?>
+<file path=customXml/itemProps76.xml><?xml version="1.0" encoding="utf-8"?>
+<ds:datastoreItem xmlns:ds="http://schemas.openxmlformats.org/officeDocument/2006/customXml" ds:itemID="{FB7D8709-11A8-46E4-996B-59B6309CD080}">
+  <ds:schemaRefs>
+    <ds:schemaRef ds:uri="http://schemas.microsoft.com/VisualStudio/2011/storyboarding/control"/>
+  </ds:schemaRefs>
+</ds:datastoreItem>
+</file>
+
+<file path=customXml/itemProps77.xml><?xml version="1.0" encoding="utf-8"?>
+<ds:datastoreItem xmlns:ds="http://schemas.openxmlformats.org/officeDocument/2006/customXml" ds:itemID="{2CA110CC-3236-4230-8DFD-46AB2228E665}">
+  <ds:schemaRefs>
+    <ds:schemaRef ds:uri="http://schemas.microsoft.com/VisualStudio/2011/storyboarding/control"/>
+  </ds:schemaRefs>
+</ds:datastoreItem>
+</file>
+
+<file path=customXml/itemProps78.xml><?xml version="1.0" encoding="utf-8"?>
+<ds:datastoreItem xmlns:ds="http://schemas.openxmlformats.org/officeDocument/2006/customXml" ds:itemID="{E0E24DFF-EBC6-44AC-9493-76161B9E172C}">
+  <ds:schemaRefs>
+    <ds:schemaRef ds:uri="http://schemas.microsoft.com/VisualStudio/2011/storyboarding/control"/>
+  </ds:schemaRefs>
+</ds:datastoreItem>
+</file>
+
+<file path=customXml/itemProps79.xml><?xml version="1.0" encoding="utf-8"?>
+<ds:datastoreItem xmlns:ds="http://schemas.openxmlformats.org/officeDocument/2006/customXml" ds:itemID="{2BB45811-00AB-47F3-8537-5EAB85FA7511}">
+  <ds:schemaRefs>
+    <ds:schemaRef ds:uri="http://schemas.microsoft.com/VisualStudio/2011/storyboarding/control"/>
+  </ds:schemaRefs>
+</ds:datastoreItem>
+</file>
+
+<file path=customXml/itemProps8.xml><?xml version="1.0" encoding="utf-8"?>
+<ds:datastoreItem xmlns:ds="http://schemas.openxmlformats.org/officeDocument/2006/customXml" ds:itemID="{7F1D8421-3468-4B1F-A259-94EC128195DE}">
+  <ds:schemaRefs>
+    <ds:schemaRef ds:uri="http://schemas.microsoft.com/VisualStudio/2011/storyboarding/control"/>
+  </ds:schemaRefs>
+</ds:datastoreItem>
+</file>
+
+<file path=customXml/itemProps80.xml><?xml version="1.0" encoding="utf-8"?>
+<ds:datastoreItem xmlns:ds="http://schemas.openxmlformats.org/officeDocument/2006/customXml" ds:itemID="{E04EABA9-06A3-4E25-AEE6-43791910BBF9}">
+  <ds:schemaRefs>
+    <ds:schemaRef ds:uri="http://schemas.microsoft.com/VisualStudio/2011/storyboarding/control"/>
+  </ds:schemaRefs>
+</ds:datastoreItem>
+</file>
+
+<file path=customXml/itemProps81.xml><?xml version="1.0" encoding="utf-8"?>
+<ds:datastoreItem xmlns:ds="http://schemas.openxmlformats.org/officeDocument/2006/customXml" ds:itemID="{F97E8034-E69A-4D44-9148-57DE07E2E2F7}">
+  <ds:schemaRefs>
+    <ds:schemaRef ds:uri="http://schemas.microsoft.com/VisualStudio/2011/storyboarding/control"/>
+  </ds:schemaRefs>
+</ds:datastoreItem>
+</file>
+
+<file path=customXml/itemProps82.xml><?xml version="1.0" encoding="utf-8"?>
+<ds:datastoreItem xmlns:ds="http://schemas.openxmlformats.org/officeDocument/2006/customXml" ds:itemID="{1504E20D-E45B-4CF7-A2C8-A3A7DC7E134C}">
+  <ds:schemaRefs>
+    <ds:schemaRef ds:uri="http://schemas.microsoft.com/VisualStudio/2011/storyboarding/control"/>
+  </ds:schemaRefs>
+</ds:datastoreItem>
+</file>
+
+<file path=customXml/itemProps83.xml><?xml version="1.0" encoding="utf-8"?>
+<ds:datastoreItem xmlns:ds="http://schemas.openxmlformats.org/officeDocument/2006/customXml" ds:itemID="{51474EF7-9CC3-4023-BC66-024AD3EE8899}">
+  <ds:schemaRefs>
+    <ds:schemaRef ds:uri="http://schemas.microsoft.com/VisualStudio/2011/storyboarding/control"/>
+  </ds:schemaRefs>
+</ds:datastoreItem>
+</file>
+
+<file path=customXml/itemProps84.xml><?xml version="1.0" encoding="utf-8"?>
+<ds:datastoreItem xmlns:ds="http://schemas.openxmlformats.org/officeDocument/2006/customXml" ds:itemID="{0414D702-B8A1-4908-83A3-7346D4446B44}">
+  <ds:schemaRefs>
+    <ds:schemaRef ds:uri="http://schemas.microsoft.com/VisualStudio/2011/storyboarding/control"/>
+  </ds:schemaRefs>
+</ds:datastoreItem>
+</file>
+
+<file path=customXml/itemProps85.xml><?xml version="1.0" encoding="utf-8"?>
+<ds:datastoreItem xmlns:ds="http://schemas.openxmlformats.org/officeDocument/2006/customXml" ds:itemID="{CF80AD5C-F7EF-4812-84A3-81E1D0889592}">
+  <ds:schemaRefs>
+    <ds:schemaRef ds:uri="http://schemas.microsoft.com/VisualStudio/2011/storyboarding/control"/>
+  </ds:schemaRefs>
+</ds:datastoreItem>
+</file>
+
+<file path=customXml/itemProps86.xml><?xml version="1.0" encoding="utf-8"?>
+<ds:datastoreItem xmlns:ds="http://schemas.openxmlformats.org/officeDocument/2006/customXml" ds:itemID="{D6FA17E7-48A0-4834-816F-F209CC087DA9}">
+  <ds:schemaRefs>
+    <ds:schemaRef ds:uri="http://schemas.microsoft.com/VisualStudio/2011/storyboarding/control"/>
+  </ds:schemaRefs>
+</ds:datastoreItem>
+</file>
+
+<file path=customXml/itemProps87.xml><?xml version="1.0" encoding="utf-8"?>
+<ds:datastoreItem xmlns:ds="http://schemas.openxmlformats.org/officeDocument/2006/customXml" ds:itemID="{0ABCFE82-0004-45BC-B97C-F83338AD5A19}">
+  <ds:schemaRefs>
+    <ds:schemaRef ds:uri="http://schemas.microsoft.com/VisualStudio/2011/storyboarding/control"/>
+  </ds:schemaRefs>
+</ds:datastoreItem>
+</file>
+
+<file path=customXml/itemProps88.xml><?xml version="1.0" encoding="utf-8"?>
+<ds:datastoreItem xmlns:ds="http://schemas.openxmlformats.org/officeDocument/2006/customXml" ds:itemID="{95B1239F-6AF3-4C1B-9E68-8DB9B8B09272}">
+  <ds:schemaRefs>
+    <ds:schemaRef ds:uri="http://schemas.microsoft.com/VisualStudio/2011/storyboarding/control"/>
+  </ds:schemaRefs>
+</ds:datastoreItem>
+</file>
+
+<file path=customXml/itemProps89.xml><?xml version="1.0" encoding="utf-8"?>
+<ds:datastoreItem xmlns:ds="http://schemas.openxmlformats.org/officeDocument/2006/customXml" ds:itemID="{53F52C43-64C8-4696-B137-0CED1A8AD725}">
+  <ds:schemaRefs>
+    <ds:schemaRef ds:uri="http://schemas.microsoft.com/VisualStudio/2011/storyboarding/control"/>
+  </ds:schemaRefs>
+</ds:datastoreItem>
+</file>
+
+<file path=customXml/itemProps9.xml><?xml version="1.0" encoding="utf-8"?>
+<ds:datastoreItem xmlns:ds="http://schemas.openxmlformats.org/officeDocument/2006/customXml" ds:itemID="{14EFB7D1-72EA-42D5-9F35-8D3FFD5498D0}">
+  <ds:schemaRefs>
+    <ds:schemaRef ds:uri="http://schemas.microsoft.com/VisualStudio/2011/storyboarding/control"/>
+  </ds:schemaRefs>
+</ds:datastoreItem>
+</file>
+
+<file path=customXml/itemProps90.xml><?xml version="1.0" encoding="utf-8"?>
+<ds:datastoreItem xmlns:ds="http://schemas.openxmlformats.org/officeDocument/2006/customXml" ds:itemID="{8772038A-AD14-4DA4-B313-139504F9C271}">
+  <ds:schemaRefs>
+    <ds:schemaRef ds:uri="http://schemas.microsoft.com/VisualStudio/2011/storyboarding/control"/>
+  </ds:schemaRefs>
+</ds:datastoreItem>
+</file>
+
+<file path=customXml/itemProps91.xml><?xml version="1.0" encoding="utf-8"?>
+<ds:datastoreItem xmlns:ds="http://schemas.openxmlformats.org/officeDocument/2006/customXml" ds:itemID="{A7C71528-3E29-4D7B-8650-2B98009CEB58}">
+  <ds:schemaRefs>
+    <ds:schemaRef ds:uri="http://schemas.microsoft.com/VisualStudio/2011/storyboarding/control"/>
+  </ds:schemaRefs>
+</ds:datastoreItem>
+</file>
+
+<file path=customXml/itemProps92.xml><?xml version="1.0" encoding="utf-8"?>
+<ds:datastoreItem xmlns:ds="http://schemas.openxmlformats.org/officeDocument/2006/customXml" ds:itemID="{3C3F21EB-4ACA-44E0-B2C7-170B62880900}">
+  <ds:schemaRefs>
+    <ds:schemaRef ds:uri="http://schemas.microsoft.com/VisualStudio/2011/storyboarding/control"/>
+  </ds:schemaRefs>
+</ds:datastoreItem>
+</file>
+
+<file path=customXml/itemProps93.xml><?xml version="1.0" encoding="utf-8"?>
 <ds:datastoreItem xmlns:ds="http://schemas.openxmlformats.org/officeDocument/2006/customXml" ds:itemID="{311A61E5-9466-40A0-9EFC-B8FAA2F4EE99}">
   <ds:schemaRefs>
     <ds:schemaRef ds:uri="http://schemas.microsoft.com/VisualStudio/2011/storyboarding/control"/>
@@ -30161,143 +30683,7 @@
 </ds:datastoreItem>
 </file>
 
-<file path=customXml/itemProps35.xml><?xml version="1.0" encoding="utf-8"?>
-<ds:datastoreItem xmlns:ds="http://schemas.openxmlformats.org/officeDocument/2006/customXml" ds:itemID="{E89553A4-5092-4056-9C58-1EA4C1D0520C}">
-  <ds:schemaRefs>
-    <ds:schemaRef ds:uri="http://schemas.microsoft.com/VisualStudio/2011/storyboarding/control"/>
-  </ds:schemaRefs>
-</ds:datastoreItem>
-</file>
-
-<file path=customXml/itemProps36.xml><?xml version="1.0" encoding="utf-8"?>
-<ds:datastoreItem xmlns:ds="http://schemas.openxmlformats.org/officeDocument/2006/customXml" ds:itemID="{98E88D4C-C1AD-4D64-BE80-CF2FAA54AC0B}">
-  <ds:schemaRefs>
-    <ds:schemaRef ds:uri="http://schemas.microsoft.com/VisualStudio/2011/storyboarding/control"/>
-  </ds:schemaRefs>
-</ds:datastoreItem>
-</file>
-
-<file path=customXml/itemProps37.xml><?xml version="1.0" encoding="utf-8"?>
-<ds:datastoreItem xmlns:ds="http://schemas.openxmlformats.org/officeDocument/2006/customXml" ds:itemID="{BA1CEC6E-37B5-48DE-8530-2E103FE14F71}">
-  <ds:schemaRefs>
-    <ds:schemaRef ds:uri="http://schemas.microsoft.com/VisualStudio/2011/storyboarding/control"/>
-  </ds:schemaRefs>
-</ds:datastoreItem>
-</file>
-
-<file path=customXml/itemProps38.xml><?xml version="1.0" encoding="utf-8"?>
-<ds:datastoreItem xmlns:ds="http://schemas.openxmlformats.org/officeDocument/2006/customXml" ds:itemID="{2B3F5897-5870-47A7-89F5-542B80939A28}">
-  <ds:schemaRefs>
-    <ds:schemaRef ds:uri="http://schemas.microsoft.com/VisualStudio/2011/storyboarding/control"/>
-  </ds:schemaRefs>
-</ds:datastoreItem>
-</file>
-
-<file path=customXml/itemProps39.xml><?xml version="1.0" encoding="utf-8"?>
-<ds:datastoreItem xmlns:ds="http://schemas.openxmlformats.org/officeDocument/2006/customXml" ds:itemID="{A7C71528-3E29-4D7B-8650-2B98009CEB58}">
-  <ds:schemaRefs>
-    <ds:schemaRef ds:uri="http://schemas.microsoft.com/VisualStudio/2011/storyboarding/control"/>
-  </ds:schemaRefs>
-</ds:datastoreItem>
-</file>
-
-<file path=customXml/itemProps4.xml><?xml version="1.0" encoding="utf-8"?>
-<ds:datastoreItem xmlns:ds="http://schemas.openxmlformats.org/officeDocument/2006/customXml" ds:itemID="{0ABCFE82-0004-45BC-B97C-F83338AD5A19}">
-  <ds:schemaRefs>
-    <ds:schemaRef ds:uri="http://schemas.microsoft.com/VisualStudio/2011/storyboarding/control"/>
-  </ds:schemaRefs>
-</ds:datastoreItem>
-</file>
-
-<file path=customXml/itemProps40.xml><?xml version="1.0" encoding="utf-8"?>
-<ds:datastoreItem xmlns:ds="http://schemas.openxmlformats.org/officeDocument/2006/customXml" ds:itemID="{C44AA76C-0712-4F96-ABF5-D4724DF8A5E6}">
-  <ds:schemaRefs>
-    <ds:schemaRef ds:uri="http://schemas.microsoft.com/VisualStudio/2011/storyboarding/control"/>
-  </ds:schemaRefs>
-</ds:datastoreItem>
-</file>
-
-<file path=customXml/itemProps41.xml><?xml version="1.0" encoding="utf-8"?>
-<ds:datastoreItem xmlns:ds="http://schemas.openxmlformats.org/officeDocument/2006/customXml" ds:itemID="{26263F03-B0D6-46AA-A32D-9CF54A1A081E}">
-  <ds:schemaRefs>
-    <ds:schemaRef ds:uri="http://schemas.microsoft.com/VisualStudio/2011/storyboarding/control"/>
-  </ds:schemaRefs>
-</ds:datastoreItem>
-</file>
-
-<file path=customXml/itemProps42.xml><?xml version="1.0" encoding="utf-8"?>
-<ds:datastoreItem xmlns:ds="http://schemas.openxmlformats.org/officeDocument/2006/customXml" ds:itemID="{B0127684-3D7A-4EC8-B1E6-CDB692FD7888}">
-  <ds:schemaRefs>
-    <ds:schemaRef ds:uri="http://schemas.microsoft.com/VisualStudio/2011/storyboarding/control"/>
-  </ds:schemaRefs>
-</ds:datastoreItem>
-</file>
-
-<file path=customXml/itemProps43.xml><?xml version="1.0" encoding="utf-8"?>
-<ds:datastoreItem xmlns:ds="http://schemas.openxmlformats.org/officeDocument/2006/customXml" ds:itemID="{FCF4D0A2-3E24-4C37-A80A-0F241AF9BBA2}">
-  <ds:schemaRefs>
-    <ds:schemaRef ds:uri="http://schemas.microsoft.com/VisualStudio/2011/storyboarding/control"/>
-  </ds:schemaRefs>
-</ds:datastoreItem>
-</file>
-
-<file path=customXml/itemProps44.xml><?xml version="1.0" encoding="utf-8"?>
-<ds:datastoreItem xmlns:ds="http://schemas.openxmlformats.org/officeDocument/2006/customXml" ds:itemID="{B9E39582-20FB-40E5-8D7B-3893BFE80B2F}">
-  <ds:schemaRefs>
-    <ds:schemaRef ds:uri="http://schemas.microsoft.com/VisualStudio/2011/storyboarding/control"/>
-  </ds:schemaRefs>
-</ds:datastoreItem>
-</file>
-
-<file path=customXml/itemProps45.xml><?xml version="1.0" encoding="utf-8"?>
-<ds:datastoreItem xmlns:ds="http://schemas.openxmlformats.org/officeDocument/2006/customXml" ds:itemID="{2415F925-55B2-4C00-9C22-0B759C9F5441}">
-  <ds:schemaRefs>
-    <ds:schemaRef ds:uri="http://schemas.microsoft.com/VisualStudio/2011/storyboarding/control"/>
-  </ds:schemaRefs>
-</ds:datastoreItem>
-</file>
-
-<file path=customXml/itemProps46.xml><?xml version="1.0" encoding="utf-8"?>
-<ds:datastoreItem xmlns:ds="http://schemas.openxmlformats.org/officeDocument/2006/customXml" ds:itemID="{58AABF35-1F4B-47DB-8ED0-17C853FAF05E}">
-  <ds:schemaRefs>
-    <ds:schemaRef ds:uri="http://schemas.microsoft.com/VisualStudio/2011/storyboarding/control"/>
-  </ds:schemaRefs>
-</ds:datastoreItem>
-</file>
-
-<file path=customXml/itemProps47.xml><?xml version="1.0" encoding="utf-8"?>
-<ds:datastoreItem xmlns:ds="http://schemas.openxmlformats.org/officeDocument/2006/customXml" ds:itemID="{064331DB-7518-410D-A0D8-5284293AA1EB}">
-  <ds:schemaRefs>
-    <ds:schemaRef ds:uri="http://schemas.microsoft.com/VisualStudio/2011/storyboarding/control"/>
-  </ds:schemaRefs>
-</ds:datastoreItem>
-</file>
-
-<file path=customXml/itemProps48.xml><?xml version="1.0" encoding="utf-8"?>
-<ds:datastoreItem xmlns:ds="http://schemas.openxmlformats.org/officeDocument/2006/customXml" ds:itemID="{AC5BBA2E-2296-47A0-956B-285D5036D2E5}">
-  <ds:schemaRefs>
-    <ds:schemaRef ds:uri="http://schemas.microsoft.com/VisualStudio/2011/storyboarding/control"/>
-  </ds:schemaRefs>
-</ds:datastoreItem>
-</file>
-
-<file path=customXml/itemProps49.xml><?xml version="1.0" encoding="utf-8"?>
-<ds:datastoreItem xmlns:ds="http://schemas.openxmlformats.org/officeDocument/2006/customXml" ds:itemID="{3AD8B322-C12D-4EDB-83F5-2D2FDB6AE033}">
-  <ds:schemaRefs>
-    <ds:schemaRef ds:uri="http://schemas.microsoft.com/VisualStudio/2011/storyboarding/control"/>
-  </ds:schemaRefs>
-</ds:datastoreItem>
-</file>
-
-<file path=customXml/itemProps5.xml><?xml version="1.0" encoding="utf-8"?>
-<ds:datastoreItem xmlns:ds="http://schemas.openxmlformats.org/officeDocument/2006/customXml" ds:itemID="{E7135E8E-149E-43E8-8716-7AFFA79ABB83}">
-  <ds:schemaRefs>
-    <ds:schemaRef ds:uri="http://schemas.microsoft.com/VisualStudio/2011/storyboarding/control"/>
-  </ds:schemaRefs>
-</ds:datastoreItem>
-</file>
-
-<file path=customXml/itemProps50.xml><?xml version="1.0" encoding="utf-8"?>
+<file path=customXml/itemProps94.xml><?xml version="1.0" encoding="utf-8"?>
 <ds:datastoreItem xmlns:ds="http://schemas.openxmlformats.org/officeDocument/2006/customXml" ds:itemID="{A620F3BE-7409-4020-9C77-14B677CE1489}">
   <ds:schemaRefs>
     <ds:schemaRef ds:uri="http://schemas.microsoft.com/VisualStudio/2011/storyboarding/control"/>
@@ -30305,39 +30691,7 @@
 </ds:datastoreItem>
 </file>
 
-<file path=customXml/itemProps51.xml><?xml version="1.0" encoding="utf-8"?>
-<ds:datastoreItem xmlns:ds="http://schemas.openxmlformats.org/officeDocument/2006/customXml" ds:itemID="{344FE49E-E784-4E46-A759-B7A09CE3D79D}">
-  <ds:schemaRefs>
-    <ds:schemaRef ds:uri="http://schemas.microsoft.com/VisualStudio/2011/storyboarding/control"/>
-  </ds:schemaRefs>
-</ds:datastoreItem>
-</file>
-
-<file path=customXml/itemProps52.xml><?xml version="1.0" encoding="utf-8"?>
-<ds:datastoreItem xmlns:ds="http://schemas.openxmlformats.org/officeDocument/2006/customXml" ds:itemID="{71AD4EB6-36EB-418F-9293-1470C3743CBA}">
-  <ds:schemaRefs>
-    <ds:schemaRef ds:uri="http://schemas.microsoft.com/VisualStudio/2011/storyboarding/control"/>
-  </ds:schemaRefs>
-</ds:datastoreItem>
-</file>
-
-<file path=customXml/itemProps53.xml><?xml version="1.0" encoding="utf-8"?>
-<ds:datastoreItem xmlns:ds="http://schemas.openxmlformats.org/officeDocument/2006/customXml" ds:itemID="{B08ADF9D-738E-4F16-A242-B4C819E366A5}">
-  <ds:schemaRefs>
-    <ds:schemaRef ds:uri="http://schemas.microsoft.com/VisualStudio/2011/storyboarding/control"/>
-  </ds:schemaRefs>
-</ds:datastoreItem>
-</file>
-
-<file path=customXml/itemProps54.xml><?xml version="1.0" encoding="utf-8"?>
-<ds:datastoreItem xmlns:ds="http://schemas.openxmlformats.org/officeDocument/2006/customXml" ds:itemID="{C441ACAD-CE6B-4149-AD4A-61A9122E941E}">
-  <ds:schemaRefs>
-    <ds:schemaRef ds:uri="http://schemas.microsoft.com/VisualStudio/2011/storyboarding/control"/>
-  </ds:schemaRefs>
-</ds:datastoreItem>
-</file>
-
-<file path=customXml/itemProps55.xml><?xml version="1.0" encoding="utf-8"?>
+<file path=customXml/itemProps95.xml><?xml version="1.0" encoding="utf-8"?>
 <ds:datastoreItem xmlns:ds="http://schemas.openxmlformats.org/officeDocument/2006/customXml" ds:itemID="{7E9E4C9C-FB74-4651-A220-4F322378D8D1}">
   <ds:schemaRefs>
     <ds:schemaRef ds:uri="http://schemas.microsoft.com/VisualStudio/2011/storyboarding/control"/>
@@ -30345,360 +30699,8 @@
 </ds:datastoreItem>
 </file>
 
-<file path=customXml/itemProps56.xml><?xml version="1.0" encoding="utf-8"?>
-<ds:datastoreItem xmlns:ds="http://schemas.openxmlformats.org/officeDocument/2006/customXml" ds:itemID="{1EDC6C38-A3CA-4E6E-9C60-33A7C91AA38C}">
-  <ds:schemaRefs>
-    <ds:schemaRef ds:uri="http://schemas.microsoft.com/VisualStudio/2011/storyboarding/control"/>
-  </ds:schemaRefs>
-</ds:datastoreItem>
-</file>
-
-<file path=customXml/itemProps57.xml><?xml version="1.0" encoding="utf-8"?>
-<ds:datastoreItem xmlns:ds="http://schemas.openxmlformats.org/officeDocument/2006/customXml" ds:itemID="{1D899A92-8E9D-42C5-98A8-34D89777E9F4}">
-  <ds:schemaRefs>
-    <ds:schemaRef ds:uri="http://schemas.microsoft.com/VisualStudio/2011/storyboarding/control"/>
-  </ds:schemaRefs>
-</ds:datastoreItem>
-</file>
-
-<file path=customXml/itemProps58.xml><?xml version="1.0" encoding="utf-8"?>
-<ds:datastoreItem xmlns:ds="http://schemas.openxmlformats.org/officeDocument/2006/customXml" ds:itemID="{2B93C5E5-4DC3-46D8-B87C-C98BF5559628}">
-  <ds:schemaRefs>
-    <ds:schemaRef ds:uri="http://schemas.microsoft.com/VisualStudio/2011/storyboarding/control"/>
-  </ds:schemaRefs>
-</ds:datastoreItem>
-</file>
-
-<file path=customXml/itemProps59.xml><?xml version="1.0" encoding="utf-8"?>
-<ds:datastoreItem xmlns:ds="http://schemas.openxmlformats.org/officeDocument/2006/customXml" ds:itemID="{F426595F-EDB2-4AE5-AFB4-FA54B9A9951B}">
-  <ds:schemaRefs>
-    <ds:schemaRef ds:uri="http://schemas.microsoft.com/VisualStudio/2011/storyboarding/control"/>
-  </ds:schemaRefs>
-</ds:datastoreItem>
-</file>
-
-<file path=customXml/itemProps6.xml><?xml version="1.0" encoding="utf-8"?>
-<ds:datastoreItem xmlns:ds="http://schemas.openxmlformats.org/officeDocument/2006/customXml" ds:itemID="{4AA07A6C-68DB-4E6F-8087-E327C2426BD0}">
-  <ds:schemaRefs>
-    <ds:schemaRef ds:uri="http://schemas.microsoft.com/VisualStudio/2011/storyboarding/control"/>
-  </ds:schemaRefs>
-</ds:datastoreItem>
-</file>
-
-<file path=customXml/itemProps60.xml><?xml version="1.0" encoding="utf-8"?>
-<ds:datastoreItem xmlns:ds="http://schemas.openxmlformats.org/officeDocument/2006/customXml" ds:itemID="{FB7D8709-11A8-46E4-996B-59B6309CD080}">
-  <ds:schemaRefs>
-    <ds:schemaRef ds:uri="http://schemas.microsoft.com/VisualStudio/2011/storyboarding/control"/>
-  </ds:schemaRefs>
-</ds:datastoreItem>
-</file>
-
-<file path=customXml/itemProps61.xml><?xml version="1.0" encoding="utf-8"?>
-<ds:datastoreItem xmlns:ds="http://schemas.openxmlformats.org/officeDocument/2006/customXml" ds:itemID="{36CC1AC8-B31A-4401-9BB0-330EB0CB7C4E}">
-  <ds:schemaRefs>
-    <ds:schemaRef ds:uri="http://schemas.microsoft.com/VisualStudio/2011/storyboarding/control"/>
-  </ds:schemaRefs>
-</ds:datastoreItem>
-</file>
-
-<file path=customXml/itemProps62.xml><?xml version="1.0" encoding="utf-8"?>
-<ds:datastoreItem xmlns:ds="http://schemas.openxmlformats.org/officeDocument/2006/customXml" ds:itemID="{99B99914-C8A3-4286-92E4-E8A830CA30B8}">
-  <ds:schemaRefs>
-    <ds:schemaRef ds:uri="http://schemas.microsoft.com/VisualStudio/2011/storyboarding/control"/>
-  </ds:schemaRefs>
-</ds:datastoreItem>
-</file>
-
-<file path=customXml/itemProps63.xml><?xml version="1.0" encoding="utf-8"?>
-<ds:datastoreItem xmlns:ds="http://schemas.openxmlformats.org/officeDocument/2006/customXml" ds:itemID="{A009DD09-0E91-41FA-93DB-ADE76D45C2E8}">
-  <ds:schemaRefs>
-    <ds:schemaRef ds:uri="http://schemas.microsoft.com/VisualStudio/2011/storyboarding/control"/>
-  </ds:schemaRefs>
-</ds:datastoreItem>
-</file>
-
-<file path=customXml/itemProps64.xml><?xml version="1.0" encoding="utf-8"?>
-<ds:datastoreItem xmlns:ds="http://schemas.openxmlformats.org/officeDocument/2006/customXml" ds:itemID="{5BBCFD82-ED2F-487D-A675-50CF1EF58F4F}">
-  <ds:schemaRefs>
-    <ds:schemaRef ds:uri="http://schemas.microsoft.com/VisualStudio/2011/storyboarding/control"/>
-  </ds:schemaRefs>
-</ds:datastoreItem>
-</file>
-
-<file path=customXml/itemProps65.xml><?xml version="1.0" encoding="utf-8"?>
-<ds:datastoreItem xmlns:ds="http://schemas.openxmlformats.org/officeDocument/2006/customXml" ds:itemID="{2CA110CC-3236-4230-8DFD-46AB2228E665}">
-  <ds:schemaRefs>
-    <ds:schemaRef ds:uri="http://schemas.microsoft.com/VisualStudio/2011/storyboarding/control"/>
-  </ds:schemaRefs>
-</ds:datastoreItem>
-</file>
-
-<file path=customXml/itemProps66.xml><?xml version="1.0" encoding="utf-8"?>
-<ds:datastoreItem xmlns:ds="http://schemas.openxmlformats.org/officeDocument/2006/customXml" ds:itemID="{8B83D7D3-2CCF-447D-B462-D22A3B87D672}">
-  <ds:schemaRefs>
-    <ds:schemaRef ds:uri="http://schemas.microsoft.com/VisualStudio/2011/storyboarding/control"/>
-  </ds:schemaRefs>
-</ds:datastoreItem>
-</file>
-
-<file path=customXml/itemProps67.xml><?xml version="1.0" encoding="utf-8"?>
-<ds:datastoreItem xmlns:ds="http://schemas.openxmlformats.org/officeDocument/2006/customXml" ds:itemID="{C334EAFC-0B9F-4FD5-B23C-E7B7F8D50EB7}">
-  <ds:schemaRefs>
-    <ds:schemaRef ds:uri="http://schemas.microsoft.com/VisualStudio/2011/storyboarding/control"/>
-  </ds:schemaRefs>
-</ds:datastoreItem>
-</file>
-
-<file path=customXml/itemProps68.xml><?xml version="1.0" encoding="utf-8"?>
-<ds:datastoreItem xmlns:ds="http://schemas.openxmlformats.org/officeDocument/2006/customXml" ds:itemID="{366A075B-F0BE-4489-9A0D-4A0749BE6031}">
-  <ds:schemaRefs>
-    <ds:schemaRef ds:uri="http://schemas.microsoft.com/VisualStudio/2011/storyboarding/control"/>
-  </ds:schemaRefs>
-</ds:datastoreItem>
-</file>
-
-<file path=customXml/itemProps69.xml><?xml version="1.0" encoding="utf-8"?>
-<ds:datastoreItem xmlns:ds="http://schemas.openxmlformats.org/officeDocument/2006/customXml" ds:itemID="{AD363D84-0831-44A2-BF7B-30A738B91E75}">
-  <ds:schemaRefs>
-    <ds:schemaRef ds:uri="http://schemas.microsoft.com/VisualStudio/2011/storyboarding/control"/>
-  </ds:schemaRefs>
-</ds:datastoreItem>
-</file>
-
-<file path=customXml/itemProps7.xml><?xml version="1.0" encoding="utf-8"?>
-<ds:datastoreItem xmlns:ds="http://schemas.openxmlformats.org/officeDocument/2006/customXml" ds:itemID="{1B93EB85-367C-4534-81B3-669A88F24C03}">
-  <ds:schemaRefs>
-    <ds:schemaRef ds:uri="http://schemas.microsoft.com/VisualStudio/2011/storyboarding/control"/>
-  </ds:schemaRefs>
-</ds:datastoreItem>
-</file>
-
-<file path=customXml/itemProps70.xml><?xml version="1.0" encoding="utf-8"?>
-<ds:datastoreItem xmlns:ds="http://schemas.openxmlformats.org/officeDocument/2006/customXml" ds:itemID="{0DBC94CC-B6B0-40F4-8803-60962B1DA9F5}">
-  <ds:schemaRefs>
-    <ds:schemaRef ds:uri="http://schemas.microsoft.com/VisualStudio/2011/storyboarding/control"/>
-  </ds:schemaRefs>
-</ds:datastoreItem>
-</file>
-
-<file path=customXml/itemProps71.xml><?xml version="1.0" encoding="utf-8"?>
-<ds:datastoreItem xmlns:ds="http://schemas.openxmlformats.org/officeDocument/2006/customXml" ds:itemID="{CFAE03B5-3C04-4BF7-AFAE-7B6872285014}">
-  <ds:schemaRefs>
-    <ds:schemaRef ds:uri="http://schemas.microsoft.com/VisualStudio/2011/storyboarding/control"/>
-  </ds:schemaRefs>
-</ds:datastoreItem>
-</file>
-
-<file path=customXml/itemProps72.xml><?xml version="1.0" encoding="utf-8"?>
-<ds:datastoreItem xmlns:ds="http://schemas.openxmlformats.org/officeDocument/2006/customXml" ds:itemID="{F429A82E-902C-463F-BCE5-CEACECD98F61}">
-  <ds:schemaRefs>
-    <ds:schemaRef ds:uri="http://schemas.microsoft.com/VisualStudio/2011/storyboarding/control"/>
-  </ds:schemaRefs>
-</ds:datastoreItem>
-</file>
-
-<file path=customXml/itemProps73.xml><?xml version="1.0" encoding="utf-8"?>
-<ds:datastoreItem xmlns:ds="http://schemas.openxmlformats.org/officeDocument/2006/customXml" ds:itemID="{E0E24DFF-EBC6-44AC-9493-76161B9E172C}">
-  <ds:schemaRefs>
-    <ds:schemaRef ds:uri="http://schemas.microsoft.com/VisualStudio/2011/storyboarding/control"/>
-  </ds:schemaRefs>
-</ds:datastoreItem>
-</file>
-
-<file path=customXml/itemProps74.xml><?xml version="1.0" encoding="utf-8"?>
-<ds:datastoreItem xmlns:ds="http://schemas.openxmlformats.org/officeDocument/2006/customXml" ds:itemID="{8194725C-0298-40CE-A63D-824BD1F30F6B}">
-  <ds:schemaRefs>
-    <ds:schemaRef ds:uri="http://schemas.microsoft.com/VisualStudio/2011/storyboarding/control"/>
-  </ds:schemaRefs>
-</ds:datastoreItem>
-</file>
-
-<file path=customXml/itemProps75.xml><?xml version="1.0" encoding="utf-8"?>
-<ds:datastoreItem xmlns:ds="http://schemas.openxmlformats.org/officeDocument/2006/customXml" ds:itemID="{EC127A49-F407-471A-A80E-5F5EE70EDA4B}">
-  <ds:schemaRefs>
-    <ds:schemaRef ds:uri="http://schemas.microsoft.com/VisualStudio/2011/storyboarding/control"/>
-  </ds:schemaRefs>
-</ds:datastoreItem>
-</file>
-
-<file path=customXml/itemProps76.xml><?xml version="1.0" encoding="utf-8"?>
+<file path=customXml/itemProps96.xml><?xml version="1.0" encoding="utf-8"?>
 <ds:datastoreItem xmlns:ds="http://schemas.openxmlformats.org/officeDocument/2006/customXml" ds:itemID="{AF38426D-B889-4EFA-8FB8-C767646D5C93}">
-  <ds:schemaRefs>
-    <ds:schemaRef ds:uri="http://schemas.microsoft.com/VisualStudio/2011/storyboarding/control"/>
-  </ds:schemaRefs>
-</ds:datastoreItem>
-</file>
-
-<file path=customXml/itemProps77.xml><?xml version="1.0" encoding="utf-8"?>
-<ds:datastoreItem xmlns:ds="http://schemas.openxmlformats.org/officeDocument/2006/customXml" ds:itemID="{A77469F4-C7CF-49B6-89A1-2216DBF12A35}">
-  <ds:schemaRefs>
-    <ds:schemaRef ds:uri="http://schemas.microsoft.com/VisualStudio/2011/storyboarding/control"/>
-  </ds:schemaRefs>
-</ds:datastoreItem>
-</file>
-
-<file path=customXml/itemProps78.xml><?xml version="1.0" encoding="utf-8"?>
-<ds:datastoreItem xmlns:ds="http://schemas.openxmlformats.org/officeDocument/2006/customXml" ds:itemID="{2BB45811-00AB-47F3-8537-5EAB85FA7511}">
-  <ds:schemaRefs>
-    <ds:schemaRef ds:uri="http://schemas.microsoft.com/VisualStudio/2011/storyboarding/control"/>
-  </ds:schemaRefs>
-</ds:datastoreItem>
-</file>
-
-<file path=customXml/itemProps79.xml><?xml version="1.0" encoding="utf-8"?>
-<ds:datastoreItem xmlns:ds="http://schemas.openxmlformats.org/officeDocument/2006/customXml" ds:itemID="{14E57316-B59F-4AC7-ACEB-4EB40FDD8D0D}">
-  <ds:schemaRefs>
-    <ds:schemaRef ds:uri="http://schemas.microsoft.com/VisualStudio/2011/storyboarding/control"/>
-  </ds:schemaRefs>
-</ds:datastoreItem>
-</file>
-
-<file path=customXml/itemProps8.xml><?xml version="1.0" encoding="utf-8"?>
-<ds:datastoreItem xmlns:ds="http://schemas.openxmlformats.org/officeDocument/2006/customXml" ds:itemID="{0F5209C0-6C38-43D1-B645-38EECC490212}">
-  <ds:schemaRefs>
-    <ds:schemaRef ds:uri="http://schemas.microsoft.com/VisualStudio/2011/storyboarding/control"/>
-  </ds:schemaRefs>
-</ds:datastoreItem>
-</file>
-
-<file path=customXml/itemProps80.xml><?xml version="1.0" encoding="utf-8"?>
-<ds:datastoreItem xmlns:ds="http://schemas.openxmlformats.org/officeDocument/2006/customXml" ds:itemID="{A398BD60-31E4-432C-8143-E50754CAC136}">
-  <ds:schemaRefs>
-    <ds:schemaRef ds:uri="http://schemas.microsoft.com/VisualStudio/2011/storyboarding/control"/>
-  </ds:schemaRefs>
-</ds:datastoreItem>
-</file>
-
-<file path=customXml/itemProps81.xml><?xml version="1.0" encoding="utf-8"?>
-<ds:datastoreItem xmlns:ds="http://schemas.openxmlformats.org/officeDocument/2006/customXml" ds:itemID="{E04EABA9-06A3-4E25-AEE6-43791910BBF9}">
-  <ds:schemaRefs>
-    <ds:schemaRef ds:uri="http://schemas.microsoft.com/VisualStudio/2011/storyboarding/control"/>
-  </ds:schemaRefs>
-</ds:datastoreItem>
-</file>
-
-<file path=customXml/itemProps82.xml><?xml version="1.0" encoding="utf-8"?>
-<ds:datastoreItem xmlns:ds="http://schemas.openxmlformats.org/officeDocument/2006/customXml" ds:itemID="{A43B68ED-C766-4FB1-940C-87743424070A}">
-  <ds:schemaRefs>
-    <ds:schemaRef ds:uri="http://schemas.microsoft.com/VisualStudio/2011/storyboarding/control"/>
-  </ds:schemaRefs>
-</ds:datastoreItem>
-</file>
-
-<file path=customXml/itemProps83.xml><?xml version="1.0" encoding="utf-8"?>
-<ds:datastoreItem xmlns:ds="http://schemas.openxmlformats.org/officeDocument/2006/customXml" ds:itemID="{E0057B20-6B97-47AF-A243-7E46836062E5}">
-  <ds:schemaRefs>
-    <ds:schemaRef ds:uri="http://schemas.microsoft.com/VisualStudio/2011/storyboarding/control"/>
-  </ds:schemaRefs>
-</ds:datastoreItem>
-</file>
-
-<file path=customXml/itemProps84.xml><?xml version="1.0" encoding="utf-8"?>
-<ds:datastoreItem xmlns:ds="http://schemas.openxmlformats.org/officeDocument/2006/customXml" ds:itemID="{7F1D8421-3468-4B1F-A259-94EC128195DE}">
-  <ds:schemaRefs>
-    <ds:schemaRef ds:uri="http://schemas.microsoft.com/VisualStudio/2011/storyboarding/control"/>
-  </ds:schemaRefs>
-</ds:datastoreItem>
-</file>
-
-<file path=customXml/itemProps85.xml><?xml version="1.0" encoding="utf-8"?>
-<ds:datastoreItem xmlns:ds="http://schemas.openxmlformats.org/officeDocument/2006/customXml" ds:itemID="{57462945-5402-4C79-9227-BDFE1CA893F7}">
-  <ds:schemaRefs>
-    <ds:schemaRef ds:uri="http://schemas.microsoft.com/VisualStudio/2011/storyboarding/control"/>
-  </ds:schemaRefs>
-</ds:datastoreItem>
-</file>
-
-<file path=customXml/itemProps86.xml><?xml version="1.0" encoding="utf-8"?>
-<ds:datastoreItem xmlns:ds="http://schemas.openxmlformats.org/officeDocument/2006/customXml" ds:itemID="{F97E8034-E69A-4D44-9148-57DE07E2E2F7}">
-  <ds:schemaRefs>
-    <ds:schemaRef ds:uri="http://schemas.microsoft.com/VisualStudio/2011/storyboarding/control"/>
-  </ds:schemaRefs>
-</ds:datastoreItem>
-</file>
-
-<file path=customXml/itemProps87.xml><?xml version="1.0" encoding="utf-8"?>
-<ds:datastoreItem xmlns:ds="http://schemas.openxmlformats.org/officeDocument/2006/customXml" ds:itemID="{62135A7A-6CBC-420C-AE63-12B3AA96B443}">
-  <ds:schemaRefs>
-    <ds:schemaRef ds:uri="http://schemas.microsoft.com/VisualStudio/2011/storyboarding/control"/>
-  </ds:schemaRefs>
-</ds:datastoreItem>
-</file>
-
-<file path=customXml/itemProps88.xml><?xml version="1.0" encoding="utf-8"?>
-<ds:datastoreItem xmlns:ds="http://schemas.openxmlformats.org/officeDocument/2006/customXml" ds:itemID="{7D58A88F-75F8-4AE3-8BDF-30484A042543}">
-  <ds:schemaRefs>
-    <ds:schemaRef ds:uri="http://schemas.microsoft.com/VisualStudio/2011/storyboarding/control"/>
-  </ds:schemaRefs>
-</ds:datastoreItem>
-</file>
-
-<file path=customXml/itemProps89.xml><?xml version="1.0" encoding="utf-8"?>
-<ds:datastoreItem xmlns:ds="http://schemas.openxmlformats.org/officeDocument/2006/customXml" ds:itemID="{14EFB7D1-72EA-42D5-9F35-8D3FFD5498D0}">
-  <ds:schemaRefs>
-    <ds:schemaRef ds:uri="http://schemas.microsoft.com/VisualStudio/2011/storyboarding/control"/>
-  </ds:schemaRefs>
-</ds:datastoreItem>
-</file>
-
-<file path=customXml/itemProps9.xml><?xml version="1.0" encoding="utf-8"?>
-<ds:datastoreItem xmlns:ds="http://schemas.openxmlformats.org/officeDocument/2006/customXml" ds:itemID="{95B1239F-6AF3-4C1B-9E68-8DB9B8B09272}">
-  <ds:schemaRefs>
-    <ds:schemaRef ds:uri="http://schemas.microsoft.com/VisualStudio/2011/storyboarding/control"/>
-  </ds:schemaRefs>
-</ds:datastoreItem>
-</file>
-
-<file path=customXml/itemProps90.xml><?xml version="1.0" encoding="utf-8"?>
-<ds:datastoreItem xmlns:ds="http://schemas.openxmlformats.org/officeDocument/2006/customXml" ds:itemID="{41142646-6685-458D-A152-4DDC9DEBBB50}">
-  <ds:schemaRefs>
-    <ds:schemaRef ds:uri="http://schemas.microsoft.com/VisualStudio/2011/storyboarding/control"/>
-  </ds:schemaRefs>
-</ds:datastoreItem>
-</file>
-
-<file path=customXml/itemProps91.xml><?xml version="1.0" encoding="utf-8"?>
-<ds:datastoreItem xmlns:ds="http://schemas.openxmlformats.org/officeDocument/2006/customXml" ds:itemID="{9DE28D0E-DE7B-441F-B413-1337D6D6F6C7}">
-  <ds:schemaRefs>
-    <ds:schemaRef ds:uri="http://schemas.microsoft.com/VisualStudio/2011/storyboarding/control"/>
-  </ds:schemaRefs>
-</ds:datastoreItem>
-</file>
-
-<file path=customXml/itemProps92.xml><?xml version="1.0" encoding="utf-8"?>
-<ds:datastoreItem xmlns:ds="http://schemas.openxmlformats.org/officeDocument/2006/customXml" ds:itemID="{208FB6D1-8CEC-40AC-B779-73F8475BFAF6}">
-  <ds:schemaRefs>
-    <ds:schemaRef ds:uri="http://schemas.microsoft.com/VisualStudio/2011/storyboarding/control"/>
-  </ds:schemaRefs>
-</ds:datastoreItem>
-</file>
-
-<file path=customXml/itemProps93.xml><?xml version="1.0" encoding="utf-8"?>
-<ds:datastoreItem xmlns:ds="http://schemas.openxmlformats.org/officeDocument/2006/customXml" ds:itemID="{9E7BB052-76C8-48EA-A682-8A91C00B30D8}">
-  <ds:schemaRefs>
-    <ds:schemaRef ds:uri="http://schemas.microsoft.com/VisualStudio/2011/storyboarding/control"/>
-  </ds:schemaRefs>
-</ds:datastoreItem>
-</file>
-
-<file path=customXml/itemProps94.xml><?xml version="1.0" encoding="utf-8"?>
-<ds:datastoreItem xmlns:ds="http://schemas.openxmlformats.org/officeDocument/2006/customXml" ds:itemID="{1504E20D-E45B-4CF7-A2C8-A3A7DC7E134C}">
-  <ds:schemaRefs>
-    <ds:schemaRef ds:uri="http://schemas.microsoft.com/VisualStudio/2011/storyboarding/control"/>
-  </ds:schemaRefs>
-</ds:datastoreItem>
-</file>
-
-<file path=customXml/itemProps95.xml><?xml version="1.0" encoding="utf-8"?>
-<ds:datastoreItem xmlns:ds="http://schemas.openxmlformats.org/officeDocument/2006/customXml" ds:itemID="{28E5680E-08E7-4468-A693-3805C176B9A4}">
-  <ds:schemaRefs>
-    <ds:schemaRef ds:uri="http://schemas.microsoft.com/VisualStudio/2011/storyboarding/control"/>
-  </ds:schemaRefs>
-</ds:datastoreItem>
-</file>
-
-<file path=customXml/itemProps96.xml><?xml version="1.0" encoding="utf-8"?>
-<ds:datastoreItem xmlns:ds="http://schemas.openxmlformats.org/officeDocument/2006/customXml" ds:itemID="{6940F956-B60B-4364-AEC7-DD62F6E086AE}">
   <ds:schemaRefs>
     <ds:schemaRef ds:uri="http://schemas.microsoft.com/VisualStudio/2011/storyboarding/control"/>
   </ds:schemaRefs>
@@ -30714,7 +30716,7 @@
 </file>
 
 <file path=customXml/itemProps98.xml><?xml version="1.0" encoding="utf-8"?>
-<ds:datastoreItem xmlns:ds="http://schemas.openxmlformats.org/officeDocument/2006/customXml" ds:itemID="{AF19FD1C-AF38-4695-9E6F-7C89D1DDF47B}">
+<ds:datastoreItem xmlns:ds="http://schemas.openxmlformats.org/officeDocument/2006/customXml" ds:itemID="{03CD57E2-38C9-4F6B-A49E-1BAA5856DBAC}">
   <ds:schemaRefs>
     <ds:schemaRef ds:uri="http://schemas.microsoft.com/VisualStudio/2011/storyboarding/control"/>
   </ds:schemaRefs>
@@ -30722,7 +30724,7 @@
 </file>
 
 <file path=customXml/itemProps99.xml><?xml version="1.0" encoding="utf-8"?>
-<ds:datastoreItem xmlns:ds="http://schemas.openxmlformats.org/officeDocument/2006/customXml" ds:itemID="{51474EF7-9CC3-4023-BC66-024AD3EE8899}">
+<ds:datastoreItem xmlns:ds="http://schemas.openxmlformats.org/officeDocument/2006/customXml" ds:itemID="{A71871C3-B400-4B1D-8E65-C6A035B92536}">
   <ds:schemaRefs>
     <ds:schemaRef ds:uri="http://schemas.microsoft.com/VisualStudio/2011/storyboarding/control"/>
   </ds:schemaRefs>

</xml_diff>